<commit_message>
Creacion PowerPoint traje novio
</commit_message>
<xml_diff>
--- a/Ayuntamiento/Elegir ayuntamiento.pptx
+++ b/Ayuntamiento/Elegir ayuntamiento.pptx
@@ -6,11 +6,13 @@
   </p:sldMasterIdLst>
   <p:sldIdLst>
     <p:sldId id="256" r:id="rId2"/>
-    <p:sldId id="257" r:id="rId3"/>
-    <p:sldId id="258" r:id="rId4"/>
-    <p:sldId id="259" r:id="rId5"/>
-    <p:sldId id="260" r:id="rId6"/>
-    <p:sldId id="261" r:id="rId7"/>
+    <p:sldId id="263" r:id="rId3"/>
+    <p:sldId id="257" r:id="rId4"/>
+    <p:sldId id="258" r:id="rId5"/>
+    <p:sldId id="262" r:id="rId6"/>
+    <p:sldId id="259" r:id="rId7"/>
+    <p:sldId id="260" r:id="rId8"/>
+    <p:sldId id="261" r:id="rId9"/>
   </p:sldIdLst>
   <p:sldSz cx="12192000" cy="6858000"/>
   <p:notesSz cx="6858000" cy="9144000"/>
@@ -306,7 +308,7 @@
             <a:fld id="{B61BEF0D-F0BB-DE4B-95CE-6DB70DBA9567}" type="datetimeFigureOut">
               <a:rPr lang="en-US" dirty="0"/>
               <a:pPr/>
-              <a:t>6/5/2019</a:t>
+              <a:t>6/8/2019</a:t>
             </a:fld>
             <a:endParaRPr lang="en-US" dirty="0"/>
           </a:p>
@@ -641,7 +643,7 @@
             <a:fld id="{B61BEF0D-F0BB-DE4B-95CE-6DB70DBA9567}" type="datetimeFigureOut">
               <a:rPr lang="en-US" dirty="0"/>
               <a:pPr/>
-              <a:t>6/5/2019</a:t>
+              <a:t>6/8/2019</a:t>
             </a:fld>
             <a:endParaRPr lang="en-US" dirty="0"/>
           </a:p>
@@ -1039,7 +1041,7 @@
             <a:fld id="{B61BEF0D-F0BB-DE4B-95CE-6DB70DBA9567}" type="datetimeFigureOut">
               <a:rPr lang="en-US" dirty="0"/>
               <a:pPr/>
-              <a:t>6/5/2019</a:t>
+              <a:t>6/8/2019</a:t>
             </a:fld>
             <a:endParaRPr lang="en-US" dirty="0"/>
           </a:p>
@@ -1371,7 +1373,7 @@
             <a:fld id="{B61BEF0D-F0BB-DE4B-95CE-6DB70DBA9567}" type="datetimeFigureOut">
               <a:rPr lang="en-US" dirty="0"/>
               <a:pPr/>
-              <a:t>6/5/2019</a:t>
+              <a:t>6/8/2019</a:t>
             </a:fld>
             <a:endParaRPr lang="en-US" dirty="0"/>
           </a:p>
@@ -1688,7 +1690,7 @@
             <a:fld id="{B61BEF0D-F0BB-DE4B-95CE-6DB70DBA9567}" type="datetimeFigureOut">
               <a:rPr lang="en-US" dirty="0"/>
               <a:pPr/>
-              <a:t>6/5/2019</a:t>
+              <a:t>6/8/2019</a:t>
             </a:fld>
             <a:endParaRPr lang="en-US" dirty="0"/>
           </a:p>
@@ -2081,7 +2083,7 @@
             <a:fld id="{B61BEF0D-F0BB-DE4B-95CE-6DB70DBA9567}" type="datetimeFigureOut">
               <a:rPr lang="en-US" dirty="0"/>
               <a:pPr/>
-              <a:t>6/5/2019</a:t>
+              <a:t>6/8/2019</a:t>
             </a:fld>
             <a:endParaRPr lang="en-US" dirty="0"/>
           </a:p>
@@ -2335,7 +2337,7 @@
             <a:fld id="{B61BEF0D-F0BB-DE4B-95CE-6DB70DBA9567}" type="datetimeFigureOut">
               <a:rPr lang="en-US" dirty="0"/>
               <a:pPr/>
-              <a:t>6/5/2019</a:t>
+              <a:t>6/8/2019</a:t>
             </a:fld>
             <a:endParaRPr lang="en-US" dirty="0"/>
           </a:p>
@@ -2594,7 +2596,7 @@
             <a:fld id="{B61BEF0D-F0BB-DE4B-95CE-6DB70DBA9567}" type="datetimeFigureOut">
               <a:rPr lang="en-US" dirty="0"/>
               <a:pPr/>
-              <a:t>6/5/2019</a:t>
+              <a:t>6/8/2019</a:t>
             </a:fld>
             <a:endParaRPr lang="en-US" dirty="0"/>
           </a:p>
@@ -2853,7 +2855,7 @@
             <a:fld id="{B61BEF0D-F0BB-DE4B-95CE-6DB70DBA9567}" type="datetimeFigureOut">
               <a:rPr lang="en-US" dirty="0"/>
               <a:pPr/>
-              <a:t>6/5/2019</a:t>
+              <a:t>6/8/2019</a:t>
             </a:fld>
             <a:endParaRPr lang="en-US" dirty="0"/>
           </a:p>
@@ -3179,7 +3181,7 @@
             <a:fld id="{B61BEF0D-F0BB-DE4B-95CE-6DB70DBA9567}" type="datetimeFigureOut">
               <a:rPr lang="en-US" dirty="0"/>
               <a:pPr/>
-              <a:t>6/5/2019</a:t>
+              <a:t>6/8/2019</a:t>
             </a:fld>
             <a:endParaRPr lang="en-US" dirty="0"/>
           </a:p>
@@ -3499,7 +3501,7 @@
             <a:fld id="{B61BEF0D-F0BB-DE4B-95CE-6DB70DBA9567}" type="datetimeFigureOut">
               <a:rPr lang="en-US" dirty="0"/>
               <a:pPr/>
-              <a:t>6/5/2019</a:t>
+              <a:t>6/8/2019</a:t>
             </a:fld>
             <a:endParaRPr lang="en-US" dirty="0"/>
           </a:p>
@@ -3953,7 +3955,7 @@
             <a:fld id="{B61BEF0D-F0BB-DE4B-95CE-6DB70DBA9567}" type="datetimeFigureOut">
               <a:rPr lang="en-US" dirty="0"/>
               <a:pPr/>
-              <a:t>6/5/2019</a:t>
+              <a:t>6/8/2019</a:t>
             </a:fld>
             <a:endParaRPr lang="en-US" dirty="0"/>
           </a:p>
@@ -4155,7 +4157,7 @@
             <a:fld id="{B61BEF0D-F0BB-DE4B-95CE-6DB70DBA9567}" type="datetimeFigureOut">
               <a:rPr lang="en-US" dirty="0"/>
               <a:pPr/>
-              <a:t>6/5/2019</a:t>
+              <a:t>6/8/2019</a:t>
             </a:fld>
             <a:endParaRPr lang="en-US" dirty="0"/>
           </a:p>
@@ -4329,7 +4331,7 @@
             <a:fld id="{B61BEF0D-F0BB-DE4B-95CE-6DB70DBA9567}" type="datetimeFigureOut">
               <a:rPr lang="en-US" dirty="0"/>
               <a:pPr/>
-              <a:t>6/5/2019</a:t>
+              <a:t>6/8/2019</a:t>
             </a:fld>
             <a:endParaRPr lang="en-US" dirty="0"/>
           </a:p>
@@ -4659,7 +4661,7 @@
             <a:fld id="{B61BEF0D-F0BB-DE4B-95CE-6DB70DBA9567}" type="datetimeFigureOut">
               <a:rPr lang="en-US" dirty="0"/>
               <a:pPr/>
-              <a:t>6/5/2019</a:t>
+              <a:t>6/8/2019</a:t>
             </a:fld>
             <a:endParaRPr lang="en-US" dirty="0"/>
           </a:p>
@@ -5001,7 +5003,7 @@
             <a:fld id="{B61BEF0D-F0BB-DE4B-95CE-6DB70DBA9567}" type="datetimeFigureOut">
               <a:rPr lang="en-US" dirty="0"/>
               <a:pPr/>
-              <a:t>6/5/2019</a:t>
+              <a:t>6/8/2019</a:t>
             </a:fld>
             <a:endParaRPr lang="en-US" dirty="0"/>
           </a:p>
@@ -7115,7 +7117,7 @@
             <a:fld id="{B61BEF0D-F0BB-DE4B-95CE-6DB70DBA9567}" type="datetimeFigureOut">
               <a:rPr lang="en-US" dirty="0"/>
               <a:pPr/>
-              <a:t>6/5/2019</a:t>
+              <a:t>6/8/2019</a:t>
             </a:fld>
             <a:endParaRPr lang="en-US" dirty="0"/>
           </a:p>
@@ -7732,449 +7734,55 @@
       </p:grpSpPr>
       <p:sp>
         <p:nvSpPr>
-          <p:cNvPr id="2" name="Título 1"/>
+          <p:cNvPr id="5" name="Subtítulo 4"/>
           <p:cNvSpPr>
             <a:spLocks noGrp="1"/>
           </p:cNvSpPr>
           <p:nvPr>
-            <p:ph type="title"/>
+            <p:ph type="subTitle" idx="1"/>
           </p:nvPr>
         </p:nvSpPr>
         <p:spPr>
           <a:xfrm>
-            <a:off x="2339786" y="1137916"/>
-            <a:ext cx="8911687" cy="1280890"/>
+            <a:off x="1892528" y="1529082"/>
+            <a:ext cx="8915399" cy="4323078"/>
           </a:xfrm>
         </p:spPr>
         <p:txBody>
-          <a:bodyPr>
-            <a:normAutofit/>
-          </a:bodyPr>
+          <a:bodyPr anchor="ctr"/>
           <a:lstStyle/>
           <a:p>
-            <a:pPr algn="ctr"/>
             <a:r>
-              <a:rPr lang="es-ES" sz="4400" b="1" dirty="0" smtClean="0">
-                <a:ln w="0"/>
-                <a:solidFill>
-                  <a:schemeClr val="accent1"/>
-                </a:solidFill>
-                <a:effectLst>
-                  <a:outerShdw blurRad="38100" dist="25400" dir="5400000" algn="ctr" rotWithShape="0">
-                    <a:srgbClr val="6E747A">
-                      <a:alpha val="43000"/>
-                    </a:srgbClr>
-                  </a:outerShdw>
-                </a:effectLst>
+              <a:rPr lang="es-ES" dirty="0" smtClean="0">
+                <a:latin typeface="Arial" panose="020B0604020202020204" pitchFamily="34" charset="0"/>
+                <a:cs typeface="Arial" panose="020B0604020202020204" pitchFamily="34" charset="0"/>
               </a:rPr>
-              <a:t>Ayuntamientos</a:t>
+              <a:t>Fede y Óscar, dado que ya tenéis decidido el lugar donde se realizara vuestro encuentro matrimonial, nos hemos puesto en contacto con San Lorenzo del Escorial, y tienen disponibilidad el día de vuestro encuentro. </a:t>
             </a:r>
-            <a:endParaRPr lang="es-ES" sz="4400" b="1" dirty="0">
-              <a:ln w="0"/>
-              <a:solidFill>
-                <a:schemeClr val="accent1"/>
-              </a:solidFill>
-              <a:effectLst>
-                <a:outerShdw blurRad="38100" dist="25400" dir="5400000" algn="ctr" rotWithShape="0">
-                  <a:srgbClr val="6E747A">
-                    <a:alpha val="43000"/>
-                  </a:srgbClr>
-                </a:outerShdw>
-              </a:effectLst>
-            </a:endParaRPr>
+          </a:p>
+          <a:p>
+            <a:r>
+              <a:rPr lang="es-ES" dirty="0" smtClean="0">
+                <a:latin typeface="Arial" panose="020B0604020202020204" pitchFamily="34" charset="0"/>
+                <a:cs typeface="Arial" panose="020B0604020202020204" pitchFamily="34" charset="0"/>
+              </a:rPr>
+              <a:t>Pero dado que el presupuesto que nos han ofrecido es algo elevado, nos hemos tomado la libertad de buscar algunos presupuestos en distintos ayuntamientos de Madrid.</a:t>
+            </a:r>
+          </a:p>
+          <a:p>
+            <a:r>
+              <a:rPr lang="es-ES" dirty="0" smtClean="0">
+                <a:latin typeface="Arial" panose="020B0604020202020204" pitchFamily="34" charset="0"/>
+                <a:cs typeface="Arial" panose="020B0604020202020204" pitchFamily="34" charset="0"/>
+              </a:rPr>
+              <a:t>Quedamos a la espera de vuestra elección.</a:t>
+            </a:r>
           </a:p>
         </p:txBody>
       </p:sp>
-      <p:graphicFrame>
-        <p:nvGraphicFramePr>
-          <p:cNvPr id="4" name="Marcador de contenido 3"/>
-          <p:cNvGraphicFramePr>
-            <a:graphicFrameLocks noGrp="1"/>
-          </p:cNvGraphicFramePr>
-          <p:nvPr>
-            <p:ph idx="1"/>
-            <p:extLst>
-              <p:ext uri="{D42A27DB-BD31-4B8C-83A1-F6EECF244321}">
-                <p14:modId xmlns:p14="http://schemas.microsoft.com/office/powerpoint/2010/main" val="1876073592"/>
-              </p:ext>
-            </p:extLst>
-          </p:nvPr>
-        </p:nvGraphicFramePr>
-        <p:xfrm>
-          <a:off x="1944778" y="2838994"/>
-          <a:ext cx="9306695" cy="2386148"/>
-        </p:xfrm>
-        <a:graphic>
-          <a:graphicData uri="http://schemas.openxmlformats.org/drawingml/2006/table">
-            <a:tbl>
-              <a:tblPr firstRow="1" bandRow="1">
-                <a:tableStyleId>{5C22544A-7EE6-4342-B048-85BDC9FD1C3A}</a:tableStyleId>
-              </a:tblPr>
-              <a:tblGrid>
-                <a:gridCol w="1861339">
-                  <a:extLst>
-                    <a:ext uri="{9D8B030D-6E8A-4147-A177-3AD203B41FA5}">
-                      <a16:colId xmlns:a16="http://schemas.microsoft.com/office/drawing/2014/main" val="1603617945"/>
-                    </a:ext>
-                  </a:extLst>
-                </a:gridCol>
-                <a:gridCol w="1861339">
-                  <a:extLst>
-                    <a:ext uri="{9D8B030D-6E8A-4147-A177-3AD203B41FA5}">
-                      <a16:colId xmlns:a16="http://schemas.microsoft.com/office/drawing/2014/main" val="4224285427"/>
-                    </a:ext>
-                  </a:extLst>
-                </a:gridCol>
-                <a:gridCol w="1861339">
-                  <a:extLst>
-                    <a:ext uri="{9D8B030D-6E8A-4147-A177-3AD203B41FA5}">
-                      <a16:colId xmlns:a16="http://schemas.microsoft.com/office/drawing/2014/main" val="880292253"/>
-                    </a:ext>
-                  </a:extLst>
-                </a:gridCol>
-                <a:gridCol w="1861339">
-                  <a:extLst>
-                    <a:ext uri="{9D8B030D-6E8A-4147-A177-3AD203B41FA5}">
-                      <a16:colId xmlns:a16="http://schemas.microsoft.com/office/drawing/2014/main" val="3018654482"/>
-                    </a:ext>
-                  </a:extLst>
-                </a:gridCol>
-                <a:gridCol w="1861339">
-                  <a:extLst>
-                    <a:ext uri="{9D8B030D-6E8A-4147-A177-3AD203B41FA5}">
-                      <a16:colId xmlns:a16="http://schemas.microsoft.com/office/drawing/2014/main" val="3275504586"/>
-                    </a:ext>
-                  </a:extLst>
-                </a:gridCol>
-              </a:tblGrid>
-              <a:tr h="596537">
-                <a:tc>
-                  <a:txBody>
-                    <a:bodyPr/>
-                    <a:lstStyle/>
-                    <a:p>
-                      <a:pPr algn="ctr"/>
-                      <a:endParaRPr lang="es-ES" dirty="0"/>
-                    </a:p>
-                  </a:txBody>
-                  <a:tcPr/>
-                </a:tc>
-                <a:tc>
-                  <a:txBody>
-                    <a:bodyPr/>
-                    <a:lstStyle/>
-                    <a:p>
-                      <a:pPr algn="ctr"/>
-                      <a:r>
-                        <a:rPr lang="es-ES" dirty="0" smtClean="0"/>
-                        <a:t>Alcorcón</a:t>
-                      </a:r>
-                      <a:endParaRPr lang="es-ES" dirty="0"/>
-                    </a:p>
-                  </a:txBody>
-                  <a:tcPr anchor="ctr"/>
-                </a:tc>
-                <a:tc>
-                  <a:txBody>
-                    <a:bodyPr/>
-                    <a:lstStyle/>
-                    <a:p>
-                      <a:pPr algn="ctr"/>
-                      <a:r>
-                        <a:rPr lang="es-ES" dirty="0" smtClean="0"/>
-                        <a:t>Getafe</a:t>
-                      </a:r>
-                      <a:endParaRPr lang="es-ES" dirty="0"/>
-                    </a:p>
-                  </a:txBody>
-                  <a:tcPr anchor="ctr"/>
-                </a:tc>
-                <a:tc>
-                  <a:txBody>
-                    <a:bodyPr/>
-                    <a:lstStyle/>
-                    <a:p>
-                      <a:pPr algn="ctr"/>
-                      <a:r>
-                        <a:rPr lang="es-ES" dirty="0" smtClean="0"/>
-                        <a:t>Alcobendas</a:t>
-                      </a:r>
-                      <a:endParaRPr lang="es-ES" dirty="0"/>
-                    </a:p>
-                  </a:txBody>
-                  <a:tcPr anchor="ctr"/>
-                </a:tc>
-                <a:tc>
-                  <a:txBody>
-                    <a:bodyPr/>
-                    <a:lstStyle/>
-                    <a:p>
-                      <a:pPr algn="ctr"/>
-                      <a:r>
-                        <a:rPr lang="es-ES" dirty="0" smtClean="0"/>
-                        <a:t>Madrid</a:t>
-                      </a:r>
-                      <a:endParaRPr lang="es-ES" dirty="0"/>
-                    </a:p>
-                  </a:txBody>
-                  <a:tcPr anchor="ctr"/>
-                </a:tc>
-                <a:extLst>
-                  <a:ext uri="{0D108BD9-81ED-4DB2-BD59-A6C34878D82A}">
-                    <a16:rowId xmlns:a16="http://schemas.microsoft.com/office/drawing/2014/main" val="1555443976"/>
-                  </a:ext>
-                </a:extLst>
-              </a:tr>
-              <a:tr h="596537">
-                <a:tc>
-                  <a:txBody>
-                    <a:bodyPr/>
-                    <a:lstStyle/>
-                    <a:p>
-                      <a:r>
-                        <a:rPr lang="es-ES" dirty="0" smtClean="0"/>
-                        <a:t>Disponibilidad</a:t>
-                      </a:r>
-                      <a:endParaRPr lang="es-ES" dirty="0"/>
-                    </a:p>
-                  </a:txBody>
-                  <a:tcPr anchor="ctr"/>
-                </a:tc>
-                <a:tc>
-                  <a:txBody>
-                    <a:bodyPr/>
-                    <a:lstStyle/>
-                    <a:p>
-                      <a:pPr algn="ctr"/>
-                      <a:r>
-                        <a:rPr lang="es-ES" dirty="0" smtClean="0"/>
-                        <a:t>Si</a:t>
-                      </a:r>
-                      <a:endParaRPr lang="es-ES" dirty="0"/>
-                    </a:p>
-                  </a:txBody>
-                  <a:tcPr anchor="ctr"/>
-                </a:tc>
-                <a:tc>
-                  <a:txBody>
-                    <a:bodyPr/>
-                    <a:lstStyle/>
-                    <a:p>
-                      <a:pPr algn="ctr"/>
-                      <a:r>
-                        <a:rPr lang="es-ES" dirty="0" smtClean="0"/>
-                        <a:t>Si</a:t>
-                      </a:r>
-                      <a:endParaRPr lang="es-ES" dirty="0"/>
-                    </a:p>
-                  </a:txBody>
-                  <a:tcPr anchor="ctr"/>
-                </a:tc>
-                <a:tc>
-                  <a:txBody>
-                    <a:bodyPr/>
-                    <a:lstStyle/>
-                    <a:p>
-                      <a:pPr algn="ctr"/>
-                      <a:r>
-                        <a:rPr lang="es-ES" dirty="0" smtClean="0"/>
-                        <a:t>No </a:t>
-                      </a:r>
-                      <a:endParaRPr lang="es-ES" dirty="0"/>
-                    </a:p>
-                  </a:txBody>
-                  <a:tcPr anchor="ctr"/>
-                </a:tc>
-                <a:tc>
-                  <a:txBody>
-                    <a:bodyPr/>
-                    <a:lstStyle/>
-                    <a:p>
-                      <a:pPr algn="ctr"/>
-                      <a:r>
-                        <a:rPr lang="es-ES" dirty="0" smtClean="0"/>
-                        <a:t>Si</a:t>
-                      </a:r>
-                      <a:endParaRPr lang="es-ES" dirty="0"/>
-                    </a:p>
-                  </a:txBody>
-                  <a:tcPr anchor="ctr"/>
-                </a:tc>
-                <a:extLst>
-                  <a:ext uri="{0D108BD9-81ED-4DB2-BD59-A6C34878D82A}">
-                    <a16:rowId xmlns:a16="http://schemas.microsoft.com/office/drawing/2014/main" val="2249822014"/>
-                  </a:ext>
-                </a:extLst>
-              </a:tr>
-              <a:tr h="596537">
-                <a:tc>
-                  <a:txBody>
-                    <a:bodyPr/>
-                    <a:lstStyle/>
-                    <a:p>
-                      <a:r>
-                        <a:rPr lang="es-ES" dirty="0" smtClean="0"/>
-                        <a:t>Precio</a:t>
-                      </a:r>
-                      <a:endParaRPr lang="es-ES" dirty="0"/>
-                    </a:p>
-                  </a:txBody>
-                  <a:tcPr anchor="ctr"/>
-                </a:tc>
-                <a:tc>
-                  <a:txBody>
-                    <a:bodyPr/>
-                    <a:lstStyle/>
-                    <a:p>
-                      <a:pPr algn="ctr"/>
-                      <a:r>
-                        <a:rPr lang="es-ES" dirty="0" smtClean="0"/>
-                        <a:t>94€</a:t>
-                      </a:r>
-                      <a:endParaRPr lang="es-ES" dirty="0"/>
-                    </a:p>
-                  </a:txBody>
-                  <a:tcPr anchor="ctr"/>
-                </a:tc>
-                <a:tc>
-                  <a:txBody>
-                    <a:bodyPr/>
-                    <a:lstStyle/>
-                    <a:p>
-                      <a:pPr algn="ctr"/>
-                      <a:r>
-                        <a:rPr lang="es-ES" dirty="0" smtClean="0"/>
-                        <a:t>85€</a:t>
-                      </a:r>
-                      <a:endParaRPr lang="es-ES" dirty="0"/>
-                    </a:p>
-                  </a:txBody>
-                  <a:tcPr anchor="ctr"/>
-                </a:tc>
-                <a:tc>
-                  <a:txBody>
-                    <a:bodyPr/>
-                    <a:lstStyle/>
-                    <a:p>
-                      <a:pPr algn="ctr"/>
-                      <a:r>
-                        <a:rPr lang="es-ES" dirty="0" smtClean="0"/>
-                        <a:t>95€</a:t>
-                      </a:r>
-                      <a:endParaRPr lang="es-ES" dirty="0"/>
-                    </a:p>
-                  </a:txBody>
-                  <a:tcPr anchor="ctr"/>
-                </a:tc>
-                <a:tc>
-                  <a:txBody>
-                    <a:bodyPr/>
-                    <a:lstStyle/>
-                    <a:p>
-                      <a:pPr algn="ctr"/>
-                      <a:r>
-                        <a:rPr lang="es-ES" dirty="0" smtClean="0"/>
-                        <a:t>110€</a:t>
-                      </a:r>
-                      <a:endParaRPr lang="es-ES" dirty="0"/>
-                    </a:p>
-                  </a:txBody>
-                  <a:tcPr anchor="ctr"/>
-                </a:tc>
-                <a:extLst>
-                  <a:ext uri="{0D108BD9-81ED-4DB2-BD59-A6C34878D82A}">
-                    <a16:rowId xmlns:a16="http://schemas.microsoft.com/office/drawing/2014/main" val="1854854630"/>
-                  </a:ext>
-                </a:extLst>
-              </a:tr>
-              <a:tr h="596537">
-                <a:tc>
-                  <a:txBody>
-                    <a:bodyPr/>
-                    <a:lstStyle/>
-                    <a:p>
-                      <a:r>
-                        <a:rPr lang="es-ES" dirty="0" smtClean="0"/>
-                        <a:t>Aforo</a:t>
-                      </a:r>
-                      <a:endParaRPr lang="es-ES" dirty="0"/>
-                    </a:p>
-                  </a:txBody>
-                  <a:tcPr anchor="ctr"/>
-                </a:tc>
-                <a:tc>
-                  <a:txBody>
-                    <a:bodyPr/>
-                    <a:lstStyle/>
-                    <a:p>
-                      <a:pPr algn="ctr"/>
-                      <a:r>
-                        <a:rPr lang="es-ES" dirty="0" smtClean="0"/>
-                        <a:t>75</a:t>
-                      </a:r>
-                      <a:endParaRPr lang="es-ES" dirty="0"/>
-                    </a:p>
-                  </a:txBody>
-                  <a:tcPr anchor="ctr"/>
-                </a:tc>
-                <a:tc>
-                  <a:txBody>
-                    <a:bodyPr/>
-                    <a:lstStyle/>
-                    <a:p>
-                      <a:pPr algn="ctr"/>
-                      <a:r>
-                        <a:rPr lang="es-ES" dirty="0" smtClean="0"/>
-                        <a:t>70</a:t>
-                      </a:r>
-                      <a:endParaRPr lang="es-ES" dirty="0"/>
-                    </a:p>
-                  </a:txBody>
-                  <a:tcPr anchor="ctr"/>
-                </a:tc>
-                <a:tc>
-                  <a:txBody>
-                    <a:bodyPr/>
-                    <a:lstStyle/>
-                    <a:p>
-                      <a:pPr algn="ctr"/>
-                      <a:r>
-                        <a:rPr lang="es-ES" dirty="0" smtClean="0"/>
-                        <a:t>90</a:t>
-                      </a:r>
-                      <a:endParaRPr lang="es-ES" dirty="0"/>
-                    </a:p>
-                  </a:txBody>
-                  <a:tcPr anchor="ctr"/>
-                </a:tc>
-                <a:tc>
-                  <a:txBody>
-                    <a:bodyPr/>
-                    <a:lstStyle/>
-                    <a:p>
-                      <a:pPr algn="ctr"/>
-                      <a:r>
-                        <a:rPr lang="es-ES" dirty="0" smtClean="0"/>
-                        <a:t>115</a:t>
-                      </a:r>
-                      <a:endParaRPr lang="es-ES" dirty="0"/>
-                    </a:p>
-                  </a:txBody>
-                  <a:tcPr anchor="ctr"/>
-                </a:tc>
-                <a:extLst>
-                  <a:ext uri="{0D108BD9-81ED-4DB2-BD59-A6C34878D82A}">
-                    <a16:rowId xmlns:a16="http://schemas.microsoft.com/office/drawing/2014/main" val="1953533682"/>
-                  </a:ext>
-                </a:extLst>
-              </a:tr>
-            </a:tbl>
-          </a:graphicData>
-        </a:graphic>
-      </p:graphicFrame>
-      <p:sp>
-        <p:nvSpPr>
-          <p:cNvPr id="8" name="Subtítulo 4"/>
+      <p:sp>
+        <p:nvSpPr>
+          <p:cNvPr id="4" name="Subtítulo 4"/>
           <p:cNvSpPr txBox="1">
             <a:spLocks/>
           </p:cNvSpPr>
@@ -8422,38 +8030,22 @@
               </a:rPr>
               <a:t>Fede &amp; Óscar</a:t>
             </a:r>
-            <a:endParaRPr lang="es-ES" sz="2000" b="1" i="1" dirty="0" smtClean="0">
-              <a:effectLst>
-                <a:reflection blurRad="6350" stA="55000" endA="300" endPos="45500" dir="5400000" sy="-100000" algn="bl" rotWithShape="0"/>
-              </a:effectLst>
-              <a:latin typeface="Algerian" panose="04020705040A02060702" pitchFamily="82" charset="0"/>
-              <a:cs typeface="Arial" panose="020B0604020202020204" pitchFamily="34" charset="0"/>
-            </a:endParaRPr>
           </a:p>
         </p:txBody>
       </p:sp>
     </p:spTree>
     <p:extLst>
       <p:ext uri="{BB962C8B-B14F-4D97-AF65-F5344CB8AC3E}">
-        <p14:creationId xmlns:p14="http://schemas.microsoft.com/office/powerpoint/2010/main" val="2992000584"/>
+        <p14:creationId xmlns:p14="http://schemas.microsoft.com/office/powerpoint/2010/main" val="1971005066"/>
       </p:ext>
     </p:extLst>
   </p:cSld>
   <p:clrMapOvr>
     <a:masterClrMapping/>
   </p:clrMapOvr>
-  <mc:AlternateContent xmlns:mc="http://schemas.openxmlformats.org/markup-compatibility/2006">
-    <mc:Choice xmlns:p14="http://schemas.microsoft.com/office/powerpoint/2010/main" Requires="p14">
-      <p:transition spd="slow" p14:dur="1500">
-        <p:split orient="vert"/>
-      </p:transition>
-    </mc:Choice>
-    <mc:Fallback>
-      <p:transition spd="slow">
-        <p:split orient="vert"/>
-      </p:transition>
-    </mc:Fallback>
-  </mc:AlternateContent>
+  <p:transition spd="slow">
+    <p:randomBar dir="vert"/>
+  </p:transition>
   <p:timing>
     <p:tnLst>
       <p:par>
@@ -8488,7 +8080,7 @@
                                           </p:stCondLst>
                                         </p:cTn>
                                         <p:tgtEl>
-                                          <p:spTgt spid="8"/>
+                                          <p:spTgt spid="4"/>
                                         </p:tgtEl>
                                         <p:attrNameLst>
                                           <p:attrName>style.visibility</p:attrName>
@@ -8529,7 +8121,7 @@
       </p:par>
     </p:tnLst>
     <p:bldLst>
-      <p:bldP spid="8" grpId="0"/>
+      <p:bldP spid="4" grpId="0"/>
     </p:bldLst>
   </p:timing>
 </p:sld>
@@ -8564,17 +8156,19 @@
         </p:nvSpPr>
         <p:spPr>
           <a:xfrm>
-            <a:off x="1338891" y="223515"/>
+            <a:off x="2339786" y="1137916"/>
             <a:ext cx="8911687" cy="1280890"/>
           </a:xfrm>
         </p:spPr>
         <p:txBody>
-          <a:bodyPr anchor="ctr"/>
+          <a:bodyPr>
+            <a:normAutofit/>
+          </a:bodyPr>
           <a:lstStyle/>
           <a:p>
             <a:pPr algn="ctr"/>
             <a:r>
-              <a:rPr lang="es-ES" b="1" dirty="0" smtClean="0">
+              <a:rPr lang="es-ES" sz="4400" b="1" dirty="0" smtClean="0">
                 <a:ln w="0"/>
                 <a:solidFill>
                   <a:schemeClr val="accent1"/>
@@ -8587,9 +8181,9 @@
                   </a:outerShdw>
                 </a:effectLst>
               </a:rPr>
-              <a:t>Alcorcón</a:t>
+              <a:t>Ayuntamientos</a:t>
             </a:r>
-            <a:endParaRPr lang="es-ES" b="1" dirty="0">
+            <a:endParaRPr lang="es-ES" sz="4400" b="1" dirty="0">
               <a:ln w="0"/>
               <a:solidFill>
                 <a:schemeClr val="accent1"/>
@@ -8605,90 +8199,165 @@
           </a:p>
         </p:txBody>
       </p:sp>
-      <p:pic>
-        <p:nvPicPr>
+      <p:graphicFrame>
+        <p:nvGraphicFramePr>
           <p:cNvPr id="4" name="Marcador de contenido 3"/>
-          <p:cNvPicPr>
-            <a:picLocks noGrp="1" noChangeAspect="1"/>
-          </p:cNvPicPr>
+          <p:cNvGraphicFramePr>
+            <a:graphicFrameLocks noGrp="1"/>
+          </p:cNvGraphicFramePr>
           <p:nvPr>
             <p:ph idx="1"/>
-          </p:nvPr>
-        </p:nvPicPr>
-        <p:blipFill>
-          <a:blip r:embed="rId2">
-            <a:extLst>
-              <a:ext uri="{28A0092B-C50C-407E-A947-70E740481C1C}">
-                <a14:useLocalDpi xmlns:a14="http://schemas.microsoft.com/office/drawing/2010/main" val="0"/>
-              </a:ext>
-            </a:extLst>
-          </a:blip>
-          <a:stretch>
-            <a:fillRect/>
-          </a:stretch>
-        </p:blipFill>
-        <p:spPr>
-          <a:xfrm>
-            <a:off x="5606526" y="1663337"/>
-            <a:ext cx="5950337" cy="4459203"/>
-          </a:xfrm>
-        </p:spPr>
-      </p:pic>
-      <p:graphicFrame>
-        <p:nvGraphicFramePr>
-          <p:cNvPr id="5" name="Marcador de contenido 3"/>
-          <p:cNvGraphicFramePr>
-            <a:graphicFrameLocks/>
-          </p:cNvGraphicFramePr>
-          <p:nvPr>
             <p:extLst>
               <p:ext uri="{D42A27DB-BD31-4B8C-83A1-F6EECF244321}">
-                <p14:modId xmlns:p14="http://schemas.microsoft.com/office/powerpoint/2010/main" val="1338612158"/>
+                <p14:modId xmlns:p14="http://schemas.microsoft.com/office/powerpoint/2010/main" val="2154441079"/>
               </p:ext>
             </p:extLst>
           </p:nvPr>
         </p:nvGraphicFramePr>
         <p:xfrm>
-          <a:off x="1338891" y="3257008"/>
-          <a:ext cx="3855130" cy="1760537"/>
+          <a:off x="1944778" y="2838994"/>
+          <a:ext cx="9306695" cy="2429691"/>
         </p:xfrm>
         <a:graphic>
           <a:graphicData uri="http://schemas.openxmlformats.org/drawingml/2006/table">
             <a:tbl>
               <a:tblPr firstRow="1" bandRow="1">
-                <a:tableStyleId>{69CF1AB2-1976-4502-BF36-3FF5EA218861}</a:tableStyleId>
+                <a:tableStyleId>{5C22544A-7EE6-4342-B048-85BDC9FD1C3A}</a:tableStyleId>
               </a:tblPr>
               <a:tblGrid>
-                <a:gridCol w="2113415">
+                <a:gridCol w="1861339">
                   <a:extLst>
                     <a:ext uri="{9D8B030D-6E8A-4147-A177-3AD203B41FA5}">
                       <a16:colId xmlns:a16="http://schemas.microsoft.com/office/drawing/2014/main" val="1603617945"/>
                     </a:ext>
                   </a:extLst>
                 </a:gridCol>
-                <a:gridCol w="1741715">
+                <a:gridCol w="1861339">
                   <a:extLst>
                     <a:ext uri="{9D8B030D-6E8A-4147-A177-3AD203B41FA5}">
                       <a16:colId xmlns:a16="http://schemas.microsoft.com/office/drawing/2014/main" val="4224285427"/>
                     </a:ext>
                   </a:extLst>
                 </a:gridCol>
+                <a:gridCol w="1861339">
+                  <a:extLst>
+                    <a:ext uri="{9D8B030D-6E8A-4147-A177-3AD203B41FA5}">
+                      <a16:colId xmlns:a16="http://schemas.microsoft.com/office/drawing/2014/main" val="880292253"/>
+                    </a:ext>
+                  </a:extLst>
+                </a:gridCol>
+                <a:gridCol w="1861339">
+                  <a:extLst>
+                    <a:ext uri="{9D8B030D-6E8A-4147-A177-3AD203B41FA5}">
+                      <a16:colId xmlns:a16="http://schemas.microsoft.com/office/drawing/2014/main" val="3018654482"/>
+                    </a:ext>
+                  </a:extLst>
+                </a:gridCol>
+                <a:gridCol w="1861339">
+                  <a:extLst>
+                    <a:ext uri="{9D8B030D-6E8A-4147-A177-3AD203B41FA5}">
+                      <a16:colId xmlns:a16="http://schemas.microsoft.com/office/drawing/2014/main" val="3275504586"/>
+                    </a:ext>
+                  </a:extLst>
+                </a:gridCol>
               </a:tblGrid>
-              <a:tr h="592183">
+              <a:tr h="596537">
+                <a:tc>
+                  <a:txBody>
+                    <a:bodyPr/>
+                    <a:lstStyle/>
+                    <a:p>
+                      <a:pPr algn="ctr"/>
+                      <a:endParaRPr lang="es-ES" dirty="0"/>
+                    </a:p>
+                  </a:txBody>
+                  <a:tcPr/>
+                </a:tc>
+                <a:tc>
+                  <a:txBody>
+                    <a:bodyPr/>
+                    <a:lstStyle/>
+                    <a:p>
+                      <a:pPr algn="ctr"/>
+                      <a:r>
+                        <a:rPr lang="es-ES" sz="1800" b="1" i="0" kern="1200" dirty="0" smtClean="0">
+                          <a:solidFill>
+                            <a:schemeClr val="lt1"/>
+                          </a:solidFill>
+                          <a:effectLst/>
+                          <a:latin typeface="+mn-lt"/>
+                          <a:ea typeface="+mn-ea"/>
+                          <a:cs typeface="+mn-cs"/>
+                        </a:rPr>
+                        <a:t>San Lorenzo del Escorial</a:t>
+                      </a:r>
+                      <a:endParaRPr lang="es-ES" b="1" dirty="0"/>
+                    </a:p>
+                  </a:txBody>
+                  <a:tcPr anchor="ctr"/>
+                </a:tc>
+                <a:tc>
+                  <a:txBody>
+                    <a:bodyPr/>
+                    <a:lstStyle/>
+                    <a:p>
+                      <a:pPr algn="ctr"/>
+                      <a:r>
+                        <a:rPr lang="es-ES" dirty="0" smtClean="0"/>
+                        <a:t>Getafe</a:t>
+                      </a:r>
+                      <a:endParaRPr lang="es-ES" dirty="0"/>
+                    </a:p>
+                  </a:txBody>
+                  <a:tcPr anchor="ctr"/>
+                </a:tc>
+                <a:tc>
+                  <a:txBody>
+                    <a:bodyPr/>
+                    <a:lstStyle/>
+                    <a:p>
+                      <a:pPr algn="ctr"/>
+                      <a:r>
+                        <a:rPr lang="es-ES" dirty="0" smtClean="0"/>
+                        <a:t>Alcorcón</a:t>
+                      </a:r>
+                      <a:endParaRPr lang="es-ES" dirty="0"/>
+                    </a:p>
+                  </a:txBody>
+                  <a:tcPr anchor="ctr"/>
+                </a:tc>
+                <a:tc>
+                  <a:txBody>
+                    <a:bodyPr/>
+                    <a:lstStyle/>
+                    <a:p>
+                      <a:pPr algn="ctr"/>
+                      <a:r>
+                        <a:rPr lang="es-ES" dirty="0" smtClean="0"/>
+                        <a:t>Madrid</a:t>
+                      </a:r>
+                      <a:endParaRPr lang="es-ES" dirty="0"/>
+                    </a:p>
+                  </a:txBody>
+                  <a:tcPr anchor="ctr"/>
+                </a:tc>
+                <a:extLst>
+                  <a:ext uri="{0D108BD9-81ED-4DB2-BD59-A6C34878D82A}">
+                    <a16:rowId xmlns:a16="http://schemas.microsoft.com/office/drawing/2014/main" val="1555443976"/>
+                  </a:ext>
+                </a:extLst>
+              </a:tr>
+              <a:tr h="596537">
                 <a:tc>
                   <a:txBody>
                     <a:bodyPr/>
                     <a:lstStyle/>
                     <a:p>
                       <a:r>
-                        <a:rPr lang="es-ES" b="0" dirty="0" smtClean="0">
-                          <a:latin typeface="Bodoni MT" panose="02070603080606020203" pitchFamily="18" charset="0"/>
-                        </a:rPr>
+                        <a:rPr lang="es-ES" dirty="0" smtClean="0"/>
                         <a:t>Disponibilidad</a:t>
                       </a:r>
-                      <a:endParaRPr lang="es-ES" b="0" dirty="0">
-                        <a:latin typeface="Bodoni MT" panose="02070603080606020203" pitchFamily="18" charset="0"/>
-                      </a:endParaRPr>
+                      <a:endParaRPr lang="es-ES" dirty="0"/>
                     </a:p>
                   </a:txBody>
                   <a:tcPr anchor="ctr"/>
@@ -8712,23 +8381,83 @@
                   </a:txBody>
                   <a:tcPr anchor="ctr"/>
                 </a:tc>
+                <a:tc>
+                  <a:txBody>
+                    <a:bodyPr/>
+                    <a:lstStyle/>
+                    <a:p>
+                      <a:pPr algn="ctr"/>
+                      <a:r>
+                        <a:rPr lang="es-ES" dirty="0" smtClean="0"/>
+                        <a:t>Si</a:t>
+                      </a:r>
+                      <a:endParaRPr lang="es-ES" dirty="0"/>
+                    </a:p>
+                  </a:txBody>
+                  <a:tcPr anchor="ctr"/>
+                </a:tc>
+                <a:tc>
+                  <a:txBody>
+                    <a:bodyPr/>
+                    <a:lstStyle/>
+                    <a:p>
+                      <a:pPr algn="ctr"/>
+                      <a:r>
+                        <a:rPr lang="es-ES" dirty="0" smtClean="0"/>
+                        <a:t>No </a:t>
+                      </a:r>
+                      <a:endParaRPr lang="es-ES" dirty="0"/>
+                    </a:p>
+                  </a:txBody>
+                  <a:tcPr anchor="ctr"/>
+                </a:tc>
+                <a:tc>
+                  <a:txBody>
+                    <a:bodyPr/>
+                    <a:lstStyle/>
+                    <a:p>
+                      <a:pPr algn="ctr"/>
+                      <a:r>
+                        <a:rPr lang="es-ES" dirty="0" smtClean="0"/>
+                        <a:t>Si</a:t>
+                      </a:r>
+                      <a:endParaRPr lang="es-ES" dirty="0"/>
+                    </a:p>
+                  </a:txBody>
+                  <a:tcPr anchor="ctr"/>
+                </a:tc>
                 <a:extLst>
                   <a:ext uri="{0D108BD9-81ED-4DB2-BD59-A6C34878D82A}">
                     <a16:rowId xmlns:a16="http://schemas.microsoft.com/office/drawing/2014/main" val="2249822014"/>
                   </a:ext>
                 </a:extLst>
               </a:tr>
-              <a:tr h="584177">
+              <a:tr h="596537">
                 <a:tc>
                   <a:txBody>
                     <a:bodyPr/>
                     <a:lstStyle/>
                     <a:p>
                       <a:r>
-                        <a:rPr lang="es-ES" smtClean="0">
+                        <a:rPr lang="es-ES" dirty="0" smtClean="0"/>
+                        <a:t>Precio</a:t>
+                      </a:r>
+                      <a:endParaRPr lang="es-ES" dirty="0"/>
+                    </a:p>
+                  </a:txBody>
+                  <a:tcPr anchor="ctr"/>
+                </a:tc>
+                <a:tc>
+                  <a:txBody>
+                    <a:bodyPr/>
+                    <a:lstStyle/>
+                    <a:p>
+                      <a:pPr algn="ctr"/>
+                      <a:r>
+                        <a:rPr lang="es-ES" dirty="0" smtClean="0">
                           <a:latin typeface="Bodoni MT" panose="02070603080606020203" pitchFamily="18" charset="0"/>
                         </a:rPr>
-                        <a:t>Precio</a:t>
+                        <a:t>230€</a:t>
                       </a:r>
                       <a:endParaRPr lang="es-ES" dirty="0">
                         <a:latin typeface="Bodoni MT" panose="02070603080606020203" pitchFamily="18" charset="0"/>
@@ -8744,14 +8473,40 @@
                     <a:p>
                       <a:pPr algn="ctr"/>
                       <a:r>
-                        <a:rPr lang="es-ES" smtClean="0">
-                          <a:latin typeface="Bodoni MT" panose="02070603080606020203" pitchFamily="18" charset="0"/>
-                        </a:rPr>
-                        <a:t>94€</a:t>
+                        <a:rPr lang="es-ES" dirty="0" smtClean="0"/>
+                        <a:t>85€</a:t>
                       </a:r>
-                      <a:endParaRPr lang="es-ES" dirty="0">
-                        <a:latin typeface="Bodoni MT" panose="02070603080606020203" pitchFamily="18" charset="0"/>
-                      </a:endParaRPr>
+                      <a:endParaRPr lang="es-ES" dirty="0"/>
+                    </a:p>
+                  </a:txBody>
+                  <a:tcPr anchor="ctr"/>
+                </a:tc>
+                <a:tc>
+                  <a:txBody>
+                    <a:bodyPr/>
+                    <a:lstStyle/>
+                    <a:p>
+                      <a:pPr algn="ctr"/>
+                      <a:r>
+                        <a:rPr lang="es-ES" dirty="0" smtClean="0"/>
+                        <a:t>95€</a:t>
+                      </a:r>
+                      <a:endParaRPr lang="es-ES" dirty="0"/>
+                    </a:p>
+                  </a:txBody>
+                  <a:tcPr anchor="ctr"/>
+                </a:tc>
+                <a:tc>
+                  <a:txBody>
+                    <a:bodyPr/>
+                    <a:lstStyle/>
+                    <a:p>
+                      <a:pPr algn="ctr"/>
+                      <a:r>
+                        <a:rPr lang="es-ES" dirty="0" smtClean="0"/>
+                        <a:t>110€</a:t>
+                      </a:r>
+                      <a:endParaRPr lang="es-ES" dirty="0"/>
                     </a:p>
                   </a:txBody>
                   <a:tcPr anchor="ctr"/>
@@ -8762,17 +8517,32 @@
                   </a:ext>
                 </a:extLst>
               </a:tr>
-              <a:tr h="584177">
+              <a:tr h="596537">
                 <a:tc>
                   <a:txBody>
                     <a:bodyPr/>
                     <a:lstStyle/>
                     <a:p>
                       <a:r>
-                        <a:rPr lang="es-ES" smtClean="0">
+                        <a:rPr lang="es-ES" dirty="0" smtClean="0"/>
+                        <a:t>Aforo</a:t>
+                      </a:r>
+                      <a:endParaRPr lang="es-ES" dirty="0"/>
+                    </a:p>
+                  </a:txBody>
+                  <a:tcPr anchor="ctr"/>
+                </a:tc>
+                <a:tc>
+                  <a:txBody>
+                    <a:bodyPr/>
+                    <a:lstStyle/>
+                    <a:p>
+                      <a:pPr algn="ctr"/>
+                      <a:r>
+                        <a:rPr lang="es-ES" dirty="0" smtClean="0">
                           <a:latin typeface="Bodoni MT" panose="02070603080606020203" pitchFamily="18" charset="0"/>
                         </a:rPr>
-                        <a:t>Aforo</a:t>
+                        <a:t>280</a:t>
                       </a:r>
                       <a:endParaRPr lang="es-ES" dirty="0">
                         <a:latin typeface="Bodoni MT" panose="02070603080606020203" pitchFamily="18" charset="0"/>
@@ -8788,14 +8558,40 @@
                     <a:p>
                       <a:pPr algn="ctr"/>
                       <a:r>
-                        <a:rPr lang="es-ES" dirty="0" smtClean="0">
-                          <a:latin typeface="Bodoni MT" panose="02070603080606020203" pitchFamily="18" charset="0"/>
-                        </a:rPr>
-                        <a:t>75</a:t>
+                        <a:rPr lang="es-ES" dirty="0" smtClean="0"/>
+                        <a:t>70</a:t>
                       </a:r>
-                      <a:endParaRPr lang="es-ES" dirty="0">
-                        <a:latin typeface="Bodoni MT" panose="02070603080606020203" pitchFamily="18" charset="0"/>
-                      </a:endParaRPr>
+                      <a:endParaRPr lang="es-ES" dirty="0"/>
+                    </a:p>
+                  </a:txBody>
+                  <a:tcPr anchor="ctr"/>
+                </a:tc>
+                <a:tc>
+                  <a:txBody>
+                    <a:bodyPr/>
+                    <a:lstStyle/>
+                    <a:p>
+                      <a:pPr algn="ctr"/>
+                      <a:r>
+                        <a:rPr lang="es-ES" dirty="0" smtClean="0"/>
+                        <a:t>90</a:t>
+                      </a:r>
+                      <a:endParaRPr lang="es-ES" dirty="0"/>
+                    </a:p>
+                  </a:txBody>
+                  <a:tcPr anchor="ctr"/>
+                </a:tc>
+                <a:tc>
+                  <a:txBody>
+                    <a:bodyPr/>
+                    <a:lstStyle/>
+                    <a:p>
+                      <a:pPr algn="ctr"/>
+                      <a:r>
+                        <a:rPr lang="es-ES" dirty="0" smtClean="0"/>
+                        <a:t>115</a:t>
+                      </a:r>
+                      <a:endParaRPr lang="es-ES" dirty="0"/>
                     </a:p>
                   </a:txBody>
                   <a:tcPr anchor="ctr"/>
@@ -8812,7 +8608,7 @@
       </p:graphicFrame>
       <p:sp>
         <p:nvSpPr>
-          <p:cNvPr id="7" name="Subtítulo 4"/>
+          <p:cNvPr id="8" name="Subtítulo 4"/>
           <p:cNvSpPr txBox="1">
             <a:spLocks/>
           </p:cNvSpPr>
@@ -9060,29 +8856,31 @@
               </a:rPr>
               <a:t>Fede &amp; Óscar</a:t>
             </a:r>
-            <a:endParaRPr lang="es-ES" sz="2000" b="1" i="1" dirty="0" smtClean="0">
-              <a:effectLst>
-                <a:reflection blurRad="6350" stA="55000" endA="300" endPos="45500" dir="5400000" sy="-100000" algn="bl" rotWithShape="0"/>
-              </a:effectLst>
-              <a:latin typeface="Algerian" panose="04020705040A02060702" pitchFamily="82" charset="0"/>
-              <a:cs typeface="Arial" panose="020B0604020202020204" pitchFamily="34" charset="0"/>
-            </a:endParaRPr>
           </a:p>
         </p:txBody>
       </p:sp>
     </p:spTree>
     <p:extLst>
       <p:ext uri="{BB962C8B-B14F-4D97-AF65-F5344CB8AC3E}">
-        <p14:creationId xmlns:p14="http://schemas.microsoft.com/office/powerpoint/2010/main" val="1610732781"/>
+        <p14:creationId xmlns:p14="http://schemas.microsoft.com/office/powerpoint/2010/main" val="2992000584"/>
       </p:ext>
     </p:extLst>
   </p:cSld>
   <p:clrMapOvr>
     <a:masterClrMapping/>
   </p:clrMapOvr>
-  <p:transition spd="slow">
-    <p:randomBar dir="vert"/>
-  </p:transition>
+  <mc:AlternateContent xmlns:mc="http://schemas.openxmlformats.org/markup-compatibility/2006" xmlns:p14="http://schemas.microsoft.com/office/powerpoint/2010/main">
+    <mc:Choice Requires="p14">
+      <p:transition spd="slow" p14:dur="1500">
+        <p:split orient="vert"/>
+      </p:transition>
+    </mc:Choice>
+    <mc:Fallback xmlns="">
+      <p:transition spd="slow">
+        <p:split orient="vert"/>
+      </p:transition>
+    </mc:Fallback>
+  </mc:AlternateContent>
   <p:timing>
     <p:tnLst>
       <p:par>
@@ -9117,7 +8915,7 @@
                                           </p:stCondLst>
                                         </p:cTn>
                                         <p:tgtEl>
-                                          <p:spTgt spid="7"/>
+                                          <p:spTgt spid="8"/>
                                         </p:tgtEl>
                                         <p:attrNameLst>
                                           <p:attrName>style.visibility</p:attrName>
@@ -9158,7 +8956,7 @@
       </p:par>
     </p:tnLst>
     <p:bldLst>
-      <p:bldP spid="7" grpId="0"/>
+      <p:bldP spid="8" grpId="0"/>
     </p:bldLst>
   </p:timing>
 </p:sld>
@@ -9203,20 +9001,8 @@
           <a:p>
             <a:pPr algn="ctr"/>
             <a:r>
-              <a:rPr lang="es-ES" b="1" dirty="0" smtClean="0">
-                <a:ln w="0"/>
-                <a:solidFill>
-                  <a:schemeClr val="accent1"/>
-                </a:solidFill>
-                <a:effectLst>
-                  <a:outerShdw blurRad="38100" dist="25400" dir="5400000" algn="ctr" rotWithShape="0">
-                    <a:srgbClr val="6E747A">
-                      <a:alpha val="43000"/>
-                    </a:srgbClr>
-                  </a:outerShdw>
-                </a:effectLst>
-              </a:rPr>
-              <a:t>Getafe</a:t>
+              <a:rPr lang="es-ES" dirty="0"/>
+              <a:t>San Lorenzo del Escorial</a:t>
             </a:r>
             <a:endParaRPr lang="es-ES" b="1" dirty="0">
               <a:ln w="0"/>
@@ -9234,6 +9020,35 @@
           </a:p>
         </p:txBody>
       </p:sp>
+      <p:pic>
+        <p:nvPicPr>
+          <p:cNvPr id="4" name="Marcador de contenido 3"/>
+          <p:cNvPicPr>
+            <a:picLocks noGrp="1" noChangeAspect="1"/>
+          </p:cNvPicPr>
+          <p:nvPr>
+            <p:ph idx="1"/>
+          </p:nvPr>
+        </p:nvPicPr>
+        <p:blipFill>
+          <a:blip r:embed="rId2">
+            <a:extLst>
+              <a:ext uri="{28A0092B-C50C-407E-A947-70E740481C1C}">
+                <a14:useLocalDpi xmlns:a14="http://schemas.microsoft.com/office/drawing/2010/main" val="0"/>
+              </a:ext>
+            </a:extLst>
+          </a:blip>
+          <a:stretch>
+            <a:fillRect/>
+          </a:stretch>
+        </p:blipFill>
+        <p:spPr>
+          <a:xfrm>
+            <a:off x="5606526" y="1663337"/>
+            <a:ext cx="5950337" cy="4459203"/>
+          </a:xfrm>
+        </p:spPr>
+      </p:pic>
       <p:graphicFrame>
         <p:nvGraphicFramePr>
           <p:cNvPr id="5" name="Marcador de contenido 3"/>
@@ -9243,7 +9058,7 @@
           <p:nvPr>
             <p:extLst>
               <p:ext uri="{D42A27DB-BD31-4B8C-83A1-F6EECF244321}">
-                <p14:modId xmlns:p14="http://schemas.microsoft.com/office/powerpoint/2010/main" val="1345262401"/>
+                <p14:modId xmlns:p14="http://schemas.microsoft.com/office/powerpoint/2010/main" val="88637914"/>
               </p:ext>
             </p:extLst>
           </p:nvPr>
@@ -9347,7 +9162,7 @@
                         <a:rPr lang="es-ES" dirty="0" smtClean="0">
                           <a:latin typeface="Bodoni MT" panose="02070603080606020203" pitchFamily="18" charset="0"/>
                         </a:rPr>
-                        <a:t>85€</a:t>
+                        <a:t>230€</a:t>
                       </a:r>
                       <a:endParaRPr lang="es-ES" dirty="0">
                         <a:latin typeface="Bodoni MT" panose="02070603080606020203" pitchFamily="18" charset="0"/>
@@ -9391,7 +9206,7 @@
                         <a:rPr lang="es-ES" dirty="0" smtClean="0">
                           <a:latin typeface="Bodoni MT" panose="02070603080606020203" pitchFamily="18" charset="0"/>
                         </a:rPr>
-                        <a:t>70</a:t>
+                        <a:t>280</a:t>
                       </a:r>
                       <a:endParaRPr lang="es-ES" dirty="0">
                         <a:latin typeface="Bodoni MT" panose="02070603080606020203" pitchFamily="18" charset="0"/>
@@ -9410,35 +9225,6 @@
           </a:graphicData>
         </a:graphic>
       </p:graphicFrame>
-      <p:pic>
-        <p:nvPicPr>
-          <p:cNvPr id="8" name="Marcador de contenido 7"/>
-          <p:cNvPicPr>
-            <a:picLocks noGrp="1" noChangeAspect="1"/>
-          </p:cNvPicPr>
-          <p:nvPr>
-            <p:ph idx="1"/>
-          </p:nvPr>
-        </p:nvPicPr>
-        <p:blipFill>
-          <a:blip r:embed="rId2">
-            <a:extLst>
-              <a:ext uri="{28A0092B-C50C-407E-A947-70E740481C1C}">
-                <a14:useLocalDpi xmlns:a14="http://schemas.microsoft.com/office/drawing/2010/main" val="0"/>
-              </a:ext>
-            </a:extLst>
-          </a:blip>
-          <a:stretch>
-            <a:fillRect/>
-          </a:stretch>
-        </p:blipFill>
-        <p:spPr>
-          <a:xfrm>
-            <a:off x="5690230" y="1856265"/>
-            <a:ext cx="6166011" cy="4100398"/>
-          </a:xfrm>
-        </p:spPr>
-      </p:pic>
       <p:sp>
         <p:nvSpPr>
           <p:cNvPr id="7" name="Subtítulo 4"/>
@@ -9689,20 +9475,13 @@
               </a:rPr>
               <a:t>Fede &amp; Óscar</a:t>
             </a:r>
-            <a:endParaRPr lang="es-ES" sz="2000" b="1" i="1" dirty="0" smtClean="0">
-              <a:effectLst>
-                <a:reflection blurRad="6350" stA="55000" endA="300" endPos="45500" dir="5400000" sy="-100000" algn="bl" rotWithShape="0"/>
-              </a:effectLst>
-              <a:latin typeface="Algerian" panose="04020705040A02060702" pitchFamily="82" charset="0"/>
-              <a:cs typeface="Arial" panose="020B0604020202020204" pitchFamily="34" charset="0"/>
-            </a:endParaRPr>
           </a:p>
         </p:txBody>
       </p:sp>
     </p:spTree>
     <p:extLst>
       <p:ext uri="{BB962C8B-B14F-4D97-AF65-F5344CB8AC3E}">
-        <p14:creationId xmlns:p14="http://schemas.microsoft.com/office/powerpoint/2010/main" val="114118726"/>
+        <p14:creationId xmlns:p14="http://schemas.microsoft.com/office/powerpoint/2010/main" val="1610732781"/>
       </p:ext>
     </p:extLst>
   </p:cSld>
@@ -9845,7 +9624,7 @@
                   </a:outerShdw>
                 </a:effectLst>
               </a:rPr>
-              <a:t>Madrid</a:t>
+              <a:t>Alcorcón</a:t>
             </a:r>
             <a:endParaRPr lang="es-ES" b="1" dirty="0">
               <a:ln w="0"/>
@@ -9863,6 +9642,35 @@
           </a:p>
         </p:txBody>
       </p:sp>
+      <p:pic>
+        <p:nvPicPr>
+          <p:cNvPr id="4" name="Marcador de contenido 3"/>
+          <p:cNvPicPr>
+            <a:picLocks noGrp="1" noChangeAspect="1"/>
+          </p:cNvPicPr>
+          <p:nvPr>
+            <p:ph idx="1"/>
+          </p:nvPr>
+        </p:nvPicPr>
+        <p:blipFill>
+          <a:blip r:embed="rId2">
+            <a:extLst>
+              <a:ext uri="{28A0092B-C50C-407E-A947-70E740481C1C}">
+                <a14:useLocalDpi xmlns:a14="http://schemas.microsoft.com/office/drawing/2010/main" val="0"/>
+              </a:ext>
+            </a:extLst>
+          </a:blip>
+          <a:stretch>
+            <a:fillRect/>
+          </a:stretch>
+        </p:blipFill>
+        <p:spPr>
+          <a:xfrm>
+            <a:off x="5606526" y="1663337"/>
+            <a:ext cx="5950337" cy="4459203"/>
+          </a:xfrm>
+        </p:spPr>
+      </p:pic>
       <p:graphicFrame>
         <p:nvGraphicFramePr>
           <p:cNvPr id="5" name="Marcador de contenido 3"/>
@@ -9872,7 +9680,7 @@
           <p:nvPr>
             <p:extLst>
               <p:ext uri="{D42A27DB-BD31-4B8C-83A1-F6EECF244321}">
-                <p14:modId xmlns:p14="http://schemas.microsoft.com/office/powerpoint/2010/main" val="3016428131"/>
+                <p14:modId xmlns:p14="http://schemas.microsoft.com/office/powerpoint/2010/main" val="1338612158"/>
               </p:ext>
             </p:extLst>
           </p:nvPr>
@@ -9973,10 +9781,10 @@
                     <a:p>
                       <a:pPr algn="ctr"/>
                       <a:r>
-                        <a:rPr lang="es-ES" dirty="0" smtClean="0">
+                        <a:rPr lang="es-ES" smtClean="0">
                           <a:latin typeface="Bodoni MT" panose="02070603080606020203" pitchFamily="18" charset="0"/>
                         </a:rPr>
-                        <a:t>110€</a:t>
+                        <a:t>94€</a:t>
                       </a:r>
                       <a:endParaRPr lang="es-ES" dirty="0">
                         <a:latin typeface="Bodoni MT" panose="02070603080606020203" pitchFamily="18" charset="0"/>
@@ -10020,7 +9828,7 @@
                         <a:rPr lang="es-ES" dirty="0" smtClean="0">
                           <a:latin typeface="Bodoni MT" panose="02070603080606020203" pitchFamily="18" charset="0"/>
                         </a:rPr>
-                        <a:t>115</a:t>
+                        <a:t>75</a:t>
                       </a:r>
                       <a:endParaRPr lang="es-ES" dirty="0">
                         <a:latin typeface="Bodoni MT" panose="02070603080606020203" pitchFamily="18" charset="0"/>
@@ -10039,35 +9847,6 @@
           </a:graphicData>
         </a:graphic>
       </p:graphicFrame>
-      <p:pic>
-        <p:nvPicPr>
-          <p:cNvPr id="6" name="Marcador de contenido 5"/>
-          <p:cNvPicPr>
-            <a:picLocks noGrp="1" noChangeAspect="1"/>
-          </p:cNvPicPr>
-          <p:nvPr>
-            <p:ph idx="1"/>
-          </p:nvPr>
-        </p:nvPicPr>
-        <p:blipFill>
-          <a:blip r:embed="rId2">
-            <a:extLst>
-              <a:ext uri="{28A0092B-C50C-407E-A947-70E740481C1C}">
-                <a14:useLocalDpi xmlns:a14="http://schemas.microsoft.com/office/drawing/2010/main" val="0"/>
-              </a:ext>
-            </a:extLst>
-          </a:blip>
-          <a:stretch>
-            <a:fillRect/>
-          </a:stretch>
-        </p:blipFill>
-        <p:spPr>
-          <a:xfrm>
-            <a:off x="5646688" y="1915885"/>
-            <a:ext cx="6168025" cy="4101737"/>
-          </a:xfrm>
-        </p:spPr>
-      </p:pic>
       <p:sp>
         <p:nvSpPr>
           <p:cNvPr id="7" name="Subtítulo 4"/>
@@ -10318,20 +10097,13 @@
               </a:rPr>
               <a:t>Fede &amp; Óscar</a:t>
             </a:r>
-            <a:endParaRPr lang="es-ES" sz="2000" b="1" i="1" dirty="0" smtClean="0">
-              <a:effectLst>
-                <a:reflection blurRad="6350" stA="55000" endA="300" endPos="45500" dir="5400000" sy="-100000" algn="bl" rotWithShape="0"/>
-              </a:effectLst>
-              <a:latin typeface="Algerian" panose="04020705040A02060702" pitchFamily="82" charset="0"/>
-              <a:cs typeface="Arial" panose="020B0604020202020204" pitchFamily="34" charset="0"/>
-            </a:endParaRPr>
           </a:p>
         </p:txBody>
       </p:sp>
     </p:spTree>
     <p:extLst>
       <p:ext uri="{BB962C8B-B14F-4D97-AF65-F5344CB8AC3E}">
-        <p14:creationId xmlns:p14="http://schemas.microsoft.com/office/powerpoint/2010/main" val="1758079688"/>
+        <p14:creationId xmlns:p14="http://schemas.microsoft.com/office/powerpoint/2010/main" val="968892947"/>
       </p:ext>
     </p:extLst>
   </p:cSld>
@@ -10441,89 +10213,265 @@
       </p:grpSpPr>
       <p:sp>
         <p:nvSpPr>
-          <p:cNvPr id="5" name="Subtítulo 4"/>
+          <p:cNvPr id="2" name="Título 1"/>
           <p:cNvSpPr>
             <a:spLocks noGrp="1"/>
           </p:cNvSpPr>
           <p:nvPr>
-            <p:ph type="subTitle" idx="1"/>
+            <p:ph type="title"/>
           </p:nvPr>
         </p:nvSpPr>
         <p:spPr>
           <a:xfrm>
-            <a:off x="1892528" y="1529082"/>
-            <a:ext cx="8915399" cy="4323078"/>
+            <a:off x="1338891" y="223515"/>
+            <a:ext cx="8911687" cy="1280890"/>
           </a:xfrm>
         </p:spPr>
         <p:txBody>
-          <a:bodyPr/>
+          <a:bodyPr anchor="ctr"/>
           <a:lstStyle/>
           <a:p>
-            <a:r>
-              <a:rPr lang="es-ES" dirty="0" smtClean="0">
-                <a:latin typeface="Arial" panose="020B0604020202020204" pitchFamily="34" charset="0"/>
-                <a:cs typeface="Arial" panose="020B0604020202020204" pitchFamily="34" charset="0"/>
-              </a:rPr>
-              <a:t>Estos serian los ayuntamientos mas cercanos a su vivienda.</a:t>
-            </a:r>
-          </a:p>
-          <a:p>
-            <a:endParaRPr lang="es-ES" dirty="0" smtClean="0">
-              <a:latin typeface="Arial" panose="020B0604020202020204" pitchFamily="34" charset="0"/>
-              <a:cs typeface="Arial" panose="020B0604020202020204" pitchFamily="34" charset="0"/>
-            </a:endParaRPr>
-          </a:p>
-          <a:p>
-            <a:r>
-              <a:rPr lang="es-ES" dirty="0" smtClean="0">
-                <a:latin typeface="Arial" panose="020B0604020202020204" pitchFamily="34" charset="0"/>
-                <a:cs typeface="Arial" panose="020B0604020202020204" pitchFamily="34" charset="0"/>
-              </a:rPr>
-              <a:t>Nos gustaría saber con esta información que les hemos proporcionado, si les gusta alguno de estos ayuntamientos para vuestro enlace matrimonial.</a:t>
-            </a:r>
-          </a:p>
-          <a:p>
-            <a:endParaRPr lang="es-ES" dirty="0">
-              <a:latin typeface="Arial" panose="020B0604020202020204" pitchFamily="34" charset="0"/>
-              <a:cs typeface="Arial" panose="020B0604020202020204" pitchFamily="34" charset="0"/>
-            </a:endParaRPr>
-          </a:p>
-          <a:p>
-            <a:r>
-              <a:rPr lang="es-ES" dirty="0" smtClean="0">
-                <a:latin typeface="Arial" panose="020B0604020202020204" pitchFamily="34" charset="0"/>
-                <a:cs typeface="Arial" panose="020B0604020202020204" pitchFamily="34" charset="0"/>
-              </a:rPr>
-              <a:t>Si alguno de ellos es de su agrado díganoslo y reservaremos al instante, en caso contrario díganos si tiene algún ayuntamiento en particular donde desee hacer la celebración o si prefiere que le volvamos a enviar presupuestos de otros ayuntamientos.</a:t>
-            </a:r>
-          </a:p>
-          <a:p>
-            <a:endParaRPr lang="es-ES" dirty="0">
-              <a:latin typeface="Arial" panose="020B0604020202020204" pitchFamily="34" charset="0"/>
-              <a:cs typeface="Arial" panose="020B0604020202020204" pitchFamily="34" charset="0"/>
-            </a:endParaRPr>
-          </a:p>
-          <a:p>
-            <a:r>
-              <a:rPr lang="es-ES" dirty="0" smtClean="0">
-                <a:latin typeface="Arial" panose="020B0604020202020204" pitchFamily="34" charset="0"/>
-                <a:cs typeface="Arial" panose="020B0604020202020204" pitchFamily="34" charset="0"/>
-              </a:rPr>
-              <a:t>Responder a este correo: </a:t>
-            </a:r>
+            <a:pPr algn="ctr"/>
             <a:r>
               <a:rPr lang="es-ES" b="1" dirty="0" smtClean="0">
-                <a:latin typeface="Arial" panose="020B0604020202020204" pitchFamily="34" charset="0"/>
-                <a:cs typeface="Arial" panose="020B0604020202020204" pitchFamily="34" charset="0"/>
+                <a:ln w="0"/>
+                <a:solidFill>
+                  <a:schemeClr val="accent1"/>
+                </a:solidFill>
+                <a:effectLst>
+                  <a:outerShdw blurRad="38100" dist="25400" dir="5400000" algn="ctr" rotWithShape="0">
+                    <a:srgbClr val="6E747A">
+                      <a:alpha val="43000"/>
+                    </a:srgbClr>
+                  </a:outerShdw>
+                </a:effectLst>
               </a:rPr>
-              <a:t>ivandelatorre98@Gmail.com</a:t>
+              <a:t>Getafe</a:t>
             </a:r>
+            <a:endParaRPr lang="es-ES" b="1" dirty="0">
+              <a:ln w="0"/>
+              <a:solidFill>
+                <a:schemeClr val="accent1"/>
+              </a:solidFill>
+              <a:effectLst>
+                <a:outerShdw blurRad="38100" dist="25400" dir="5400000" algn="ctr" rotWithShape="0">
+                  <a:srgbClr val="6E747A">
+                    <a:alpha val="43000"/>
+                  </a:srgbClr>
+                </a:outerShdw>
+              </a:effectLst>
+            </a:endParaRPr>
           </a:p>
         </p:txBody>
       </p:sp>
-      <p:sp>
-        <p:nvSpPr>
-          <p:cNvPr id="4" name="Subtítulo 4"/>
+      <p:graphicFrame>
+        <p:nvGraphicFramePr>
+          <p:cNvPr id="5" name="Marcador de contenido 3"/>
+          <p:cNvGraphicFramePr>
+            <a:graphicFrameLocks/>
+          </p:cNvGraphicFramePr>
+          <p:nvPr>
+            <p:extLst>
+              <p:ext uri="{D42A27DB-BD31-4B8C-83A1-F6EECF244321}">
+                <p14:modId xmlns:p14="http://schemas.microsoft.com/office/powerpoint/2010/main" val="1345262401"/>
+              </p:ext>
+            </p:extLst>
+          </p:nvPr>
+        </p:nvGraphicFramePr>
+        <p:xfrm>
+          <a:off x="1338891" y="3257008"/>
+          <a:ext cx="3855130" cy="1760537"/>
+        </p:xfrm>
+        <a:graphic>
+          <a:graphicData uri="http://schemas.openxmlformats.org/drawingml/2006/table">
+            <a:tbl>
+              <a:tblPr firstRow="1" bandRow="1">
+                <a:tableStyleId>{69CF1AB2-1976-4502-BF36-3FF5EA218861}</a:tableStyleId>
+              </a:tblPr>
+              <a:tblGrid>
+                <a:gridCol w="2113415">
+                  <a:extLst>
+                    <a:ext uri="{9D8B030D-6E8A-4147-A177-3AD203B41FA5}">
+                      <a16:colId xmlns:a16="http://schemas.microsoft.com/office/drawing/2014/main" val="1603617945"/>
+                    </a:ext>
+                  </a:extLst>
+                </a:gridCol>
+                <a:gridCol w="1741715">
+                  <a:extLst>
+                    <a:ext uri="{9D8B030D-6E8A-4147-A177-3AD203B41FA5}">
+                      <a16:colId xmlns:a16="http://schemas.microsoft.com/office/drawing/2014/main" val="4224285427"/>
+                    </a:ext>
+                  </a:extLst>
+                </a:gridCol>
+              </a:tblGrid>
+              <a:tr h="592183">
+                <a:tc>
+                  <a:txBody>
+                    <a:bodyPr/>
+                    <a:lstStyle/>
+                    <a:p>
+                      <a:r>
+                        <a:rPr lang="es-ES" b="0" dirty="0" smtClean="0">
+                          <a:latin typeface="Bodoni MT" panose="02070603080606020203" pitchFamily="18" charset="0"/>
+                        </a:rPr>
+                        <a:t>Disponibilidad</a:t>
+                      </a:r>
+                      <a:endParaRPr lang="es-ES" b="0" dirty="0">
+                        <a:latin typeface="Bodoni MT" panose="02070603080606020203" pitchFamily="18" charset="0"/>
+                      </a:endParaRPr>
+                    </a:p>
+                  </a:txBody>
+                  <a:tcPr anchor="ctr"/>
+                </a:tc>
+                <a:tc>
+                  <a:txBody>
+                    <a:bodyPr/>
+                    <a:lstStyle/>
+                    <a:p>
+                      <a:pPr algn="ctr"/>
+                      <a:r>
+                        <a:rPr lang="es-ES" b="0" dirty="0" smtClean="0">
+                          <a:latin typeface="Bodoni MT" panose="02070603080606020203" pitchFamily="18" charset="0"/>
+                        </a:rPr>
+                        <a:t>Si</a:t>
+                      </a:r>
+                      <a:endParaRPr lang="es-ES" b="0" dirty="0">
+                        <a:latin typeface="Bodoni MT" panose="02070603080606020203" pitchFamily="18" charset="0"/>
+                      </a:endParaRPr>
+                    </a:p>
+                  </a:txBody>
+                  <a:tcPr anchor="ctr"/>
+                </a:tc>
+                <a:extLst>
+                  <a:ext uri="{0D108BD9-81ED-4DB2-BD59-A6C34878D82A}">
+                    <a16:rowId xmlns:a16="http://schemas.microsoft.com/office/drawing/2014/main" val="2249822014"/>
+                  </a:ext>
+                </a:extLst>
+              </a:tr>
+              <a:tr h="584177">
+                <a:tc>
+                  <a:txBody>
+                    <a:bodyPr/>
+                    <a:lstStyle/>
+                    <a:p>
+                      <a:r>
+                        <a:rPr lang="es-ES" smtClean="0">
+                          <a:latin typeface="Bodoni MT" panose="02070603080606020203" pitchFamily="18" charset="0"/>
+                        </a:rPr>
+                        <a:t>Precio</a:t>
+                      </a:r>
+                      <a:endParaRPr lang="es-ES" dirty="0">
+                        <a:latin typeface="Bodoni MT" panose="02070603080606020203" pitchFamily="18" charset="0"/>
+                      </a:endParaRPr>
+                    </a:p>
+                  </a:txBody>
+                  <a:tcPr anchor="ctr"/>
+                </a:tc>
+                <a:tc>
+                  <a:txBody>
+                    <a:bodyPr/>
+                    <a:lstStyle/>
+                    <a:p>
+                      <a:pPr algn="ctr"/>
+                      <a:r>
+                        <a:rPr lang="es-ES" dirty="0" smtClean="0">
+                          <a:latin typeface="Bodoni MT" panose="02070603080606020203" pitchFamily="18" charset="0"/>
+                        </a:rPr>
+                        <a:t>85€</a:t>
+                      </a:r>
+                      <a:endParaRPr lang="es-ES" dirty="0">
+                        <a:latin typeface="Bodoni MT" panose="02070603080606020203" pitchFamily="18" charset="0"/>
+                      </a:endParaRPr>
+                    </a:p>
+                  </a:txBody>
+                  <a:tcPr anchor="ctr"/>
+                </a:tc>
+                <a:extLst>
+                  <a:ext uri="{0D108BD9-81ED-4DB2-BD59-A6C34878D82A}">
+                    <a16:rowId xmlns:a16="http://schemas.microsoft.com/office/drawing/2014/main" val="1854854630"/>
+                  </a:ext>
+                </a:extLst>
+              </a:tr>
+              <a:tr h="584177">
+                <a:tc>
+                  <a:txBody>
+                    <a:bodyPr/>
+                    <a:lstStyle/>
+                    <a:p>
+                      <a:r>
+                        <a:rPr lang="es-ES" smtClean="0">
+                          <a:latin typeface="Bodoni MT" panose="02070603080606020203" pitchFamily="18" charset="0"/>
+                        </a:rPr>
+                        <a:t>Aforo</a:t>
+                      </a:r>
+                      <a:endParaRPr lang="es-ES" dirty="0">
+                        <a:latin typeface="Bodoni MT" panose="02070603080606020203" pitchFamily="18" charset="0"/>
+                      </a:endParaRPr>
+                    </a:p>
+                  </a:txBody>
+                  <a:tcPr anchor="ctr"/>
+                </a:tc>
+                <a:tc>
+                  <a:txBody>
+                    <a:bodyPr/>
+                    <a:lstStyle/>
+                    <a:p>
+                      <a:pPr algn="ctr"/>
+                      <a:r>
+                        <a:rPr lang="es-ES" dirty="0" smtClean="0">
+                          <a:latin typeface="Bodoni MT" panose="02070603080606020203" pitchFamily="18" charset="0"/>
+                        </a:rPr>
+                        <a:t>70</a:t>
+                      </a:r>
+                      <a:endParaRPr lang="es-ES" dirty="0">
+                        <a:latin typeface="Bodoni MT" panose="02070603080606020203" pitchFamily="18" charset="0"/>
+                      </a:endParaRPr>
+                    </a:p>
+                  </a:txBody>
+                  <a:tcPr anchor="ctr"/>
+                </a:tc>
+                <a:extLst>
+                  <a:ext uri="{0D108BD9-81ED-4DB2-BD59-A6C34878D82A}">
+                    <a16:rowId xmlns:a16="http://schemas.microsoft.com/office/drawing/2014/main" val="1953533682"/>
+                  </a:ext>
+                </a:extLst>
+              </a:tr>
+            </a:tbl>
+          </a:graphicData>
+        </a:graphic>
+      </p:graphicFrame>
+      <p:pic>
+        <p:nvPicPr>
+          <p:cNvPr id="8" name="Marcador de contenido 7"/>
+          <p:cNvPicPr>
+            <a:picLocks noGrp="1" noChangeAspect="1"/>
+          </p:cNvPicPr>
+          <p:nvPr>
+            <p:ph idx="1"/>
+          </p:nvPr>
+        </p:nvPicPr>
+        <p:blipFill>
+          <a:blip r:embed="rId2">
+            <a:extLst>
+              <a:ext uri="{28A0092B-C50C-407E-A947-70E740481C1C}">
+                <a14:useLocalDpi xmlns:a14="http://schemas.microsoft.com/office/drawing/2010/main" val="0"/>
+              </a:ext>
+            </a:extLst>
+          </a:blip>
+          <a:stretch>
+            <a:fillRect/>
+          </a:stretch>
+        </p:blipFill>
+        <p:spPr>
+          <a:xfrm>
+            <a:off x="5690230" y="1856265"/>
+            <a:ext cx="6166011" cy="4100398"/>
+          </a:xfrm>
+        </p:spPr>
+      </p:pic>
+      <p:sp>
+        <p:nvSpPr>
+          <p:cNvPr id="7" name="Subtítulo 4"/>
           <p:cNvSpPr txBox="1">
             <a:spLocks/>
           </p:cNvSpPr>
@@ -10771,13 +10719,1088 @@
               </a:rPr>
               <a:t>Fede &amp; Óscar</a:t>
             </a:r>
-            <a:endParaRPr lang="es-ES" sz="2000" b="1" i="1" dirty="0" smtClean="0">
+          </a:p>
+        </p:txBody>
+      </p:sp>
+    </p:spTree>
+    <p:extLst>
+      <p:ext uri="{BB962C8B-B14F-4D97-AF65-F5344CB8AC3E}">
+        <p14:creationId xmlns:p14="http://schemas.microsoft.com/office/powerpoint/2010/main" val="114118726"/>
+      </p:ext>
+    </p:extLst>
+  </p:cSld>
+  <p:clrMapOvr>
+    <a:masterClrMapping/>
+  </p:clrMapOvr>
+  <p:transition spd="slow">
+    <p:randomBar dir="vert"/>
+  </p:transition>
+  <p:timing>
+    <p:tnLst>
+      <p:par>
+        <p:cTn id="1" dur="indefinite" restart="never" nodeType="tmRoot">
+          <p:childTnLst>
+            <p:seq concurrent="1" nextAc="seek">
+              <p:cTn id="2" dur="indefinite" nodeType="mainSeq">
+                <p:childTnLst>
+                  <p:par>
+                    <p:cTn id="3" fill="hold">
+                      <p:stCondLst>
+                        <p:cond delay="indefinite"/>
+                      </p:stCondLst>
+                      <p:childTnLst>
+                        <p:par>
+                          <p:cTn id="4" fill="hold">
+                            <p:stCondLst>
+                              <p:cond delay="0"/>
+                            </p:stCondLst>
+                            <p:childTnLst>
+                              <p:par>
+                                <p:cTn id="5" presetID="1" presetClass="entr" presetSubtype="0" fill="hold" grpId="0" nodeType="clickEffect">
+                                  <p:stCondLst>
+                                    <p:cond delay="0"/>
+                                  </p:stCondLst>
+                                  <p:childTnLst>
+                                    <p:set>
+                                      <p:cBhvr>
+                                        <p:cTn id="6" dur="1" fill="hold">
+                                          <p:stCondLst>
+                                            <p:cond delay="0"/>
+                                          </p:stCondLst>
+                                        </p:cTn>
+                                        <p:tgtEl>
+                                          <p:spTgt spid="7"/>
+                                        </p:tgtEl>
+                                        <p:attrNameLst>
+                                          <p:attrName>style.visibility</p:attrName>
+                                        </p:attrNameLst>
+                                      </p:cBhvr>
+                                      <p:to>
+                                        <p:strVal val="visible"/>
+                                      </p:to>
+                                    </p:set>
+                                  </p:childTnLst>
+                                </p:cTn>
+                              </p:par>
+                            </p:childTnLst>
+                          </p:cTn>
+                        </p:par>
+                      </p:childTnLst>
+                    </p:cTn>
+                  </p:par>
+                </p:childTnLst>
+              </p:cTn>
+              <p:prevCondLst>
+                <p:cond evt="onPrev" delay="0">
+                  <p:tgtEl>
+                    <p:sldTgt/>
+                  </p:tgtEl>
+                </p:cond>
+              </p:prevCondLst>
+              <p:nextCondLst>
+                <p:cond evt="onNext" delay="0">
+                  <p:tgtEl>
+                    <p:sldTgt/>
+                  </p:tgtEl>
+                </p:cond>
+              </p:nextCondLst>
+            </p:seq>
+          </p:childTnLst>
+        </p:cTn>
+      </p:par>
+    </p:tnLst>
+    <p:bldLst>
+      <p:bldP spid="7" grpId="0"/>
+    </p:bldLst>
+  </p:timing>
+</p:sld>
+</file>
+
+<file path=ppt/slides/slide7.xml><?xml version="1.0" encoding="utf-8"?>
+<p:sld xmlns:a="http://schemas.openxmlformats.org/drawingml/2006/main" xmlns:r="http://schemas.openxmlformats.org/officeDocument/2006/relationships" xmlns:p="http://schemas.openxmlformats.org/presentationml/2006/main">
+  <p:cSld>
+    <p:spTree>
+      <p:nvGrpSpPr>
+        <p:cNvPr id="1" name=""/>
+        <p:cNvGrpSpPr/>
+        <p:nvPr/>
+      </p:nvGrpSpPr>
+      <p:grpSpPr>
+        <a:xfrm>
+          <a:off x="0" y="0"/>
+          <a:ext cx="0" cy="0"/>
+          <a:chOff x="0" y="0"/>
+          <a:chExt cx="0" cy="0"/>
+        </a:xfrm>
+      </p:grpSpPr>
+      <p:sp>
+        <p:nvSpPr>
+          <p:cNvPr id="2" name="Título 1"/>
+          <p:cNvSpPr>
+            <a:spLocks noGrp="1"/>
+          </p:cNvSpPr>
+          <p:nvPr>
+            <p:ph type="title"/>
+          </p:nvPr>
+        </p:nvSpPr>
+        <p:spPr>
+          <a:xfrm>
+            <a:off x="1338891" y="223515"/>
+            <a:ext cx="8911687" cy="1280890"/>
+          </a:xfrm>
+        </p:spPr>
+        <p:txBody>
+          <a:bodyPr anchor="ctr"/>
+          <a:lstStyle/>
+          <a:p>
+            <a:pPr algn="ctr"/>
+            <a:r>
+              <a:rPr lang="es-ES" b="1" dirty="0" smtClean="0">
+                <a:ln w="0"/>
+                <a:solidFill>
+                  <a:schemeClr val="accent1"/>
+                </a:solidFill>
+                <a:effectLst>
+                  <a:outerShdw blurRad="38100" dist="25400" dir="5400000" algn="ctr" rotWithShape="0">
+                    <a:srgbClr val="6E747A">
+                      <a:alpha val="43000"/>
+                    </a:srgbClr>
+                  </a:outerShdw>
+                </a:effectLst>
+              </a:rPr>
+              <a:t>Madrid</a:t>
+            </a:r>
+            <a:endParaRPr lang="es-ES" b="1" dirty="0">
+              <a:ln w="0"/>
+              <a:solidFill>
+                <a:schemeClr val="accent1"/>
+              </a:solidFill>
               <a:effectLst>
-                <a:reflection blurRad="6350" stA="55000" endA="300" endPos="45500" dir="5400000" sy="-100000" algn="bl" rotWithShape="0"/>
+                <a:outerShdw blurRad="38100" dist="25400" dir="5400000" algn="ctr" rotWithShape="0">
+                  <a:srgbClr val="6E747A">
+                    <a:alpha val="43000"/>
+                  </a:srgbClr>
+                </a:outerShdw>
               </a:effectLst>
-              <a:latin typeface="Algerian" panose="04020705040A02060702" pitchFamily="82" charset="0"/>
+            </a:endParaRPr>
+          </a:p>
+        </p:txBody>
+      </p:sp>
+      <p:graphicFrame>
+        <p:nvGraphicFramePr>
+          <p:cNvPr id="5" name="Marcador de contenido 3"/>
+          <p:cNvGraphicFramePr>
+            <a:graphicFrameLocks/>
+          </p:cNvGraphicFramePr>
+          <p:nvPr>
+            <p:extLst>
+              <p:ext uri="{D42A27DB-BD31-4B8C-83A1-F6EECF244321}">
+                <p14:modId xmlns:p14="http://schemas.microsoft.com/office/powerpoint/2010/main" val="3016428131"/>
+              </p:ext>
+            </p:extLst>
+          </p:nvPr>
+        </p:nvGraphicFramePr>
+        <p:xfrm>
+          <a:off x="1338891" y="3257008"/>
+          <a:ext cx="3855130" cy="1760537"/>
+        </p:xfrm>
+        <a:graphic>
+          <a:graphicData uri="http://schemas.openxmlformats.org/drawingml/2006/table">
+            <a:tbl>
+              <a:tblPr firstRow="1" bandRow="1">
+                <a:tableStyleId>{69CF1AB2-1976-4502-BF36-3FF5EA218861}</a:tableStyleId>
+              </a:tblPr>
+              <a:tblGrid>
+                <a:gridCol w="2113415">
+                  <a:extLst>
+                    <a:ext uri="{9D8B030D-6E8A-4147-A177-3AD203B41FA5}">
+                      <a16:colId xmlns:a16="http://schemas.microsoft.com/office/drawing/2014/main" val="1603617945"/>
+                    </a:ext>
+                  </a:extLst>
+                </a:gridCol>
+                <a:gridCol w="1741715">
+                  <a:extLst>
+                    <a:ext uri="{9D8B030D-6E8A-4147-A177-3AD203B41FA5}">
+                      <a16:colId xmlns:a16="http://schemas.microsoft.com/office/drawing/2014/main" val="4224285427"/>
+                    </a:ext>
+                  </a:extLst>
+                </a:gridCol>
+              </a:tblGrid>
+              <a:tr h="592183">
+                <a:tc>
+                  <a:txBody>
+                    <a:bodyPr/>
+                    <a:lstStyle/>
+                    <a:p>
+                      <a:r>
+                        <a:rPr lang="es-ES" b="0" dirty="0" smtClean="0">
+                          <a:latin typeface="Bodoni MT" panose="02070603080606020203" pitchFamily="18" charset="0"/>
+                        </a:rPr>
+                        <a:t>Disponibilidad</a:t>
+                      </a:r>
+                      <a:endParaRPr lang="es-ES" b="0" dirty="0">
+                        <a:latin typeface="Bodoni MT" panose="02070603080606020203" pitchFamily="18" charset="0"/>
+                      </a:endParaRPr>
+                    </a:p>
+                  </a:txBody>
+                  <a:tcPr anchor="ctr"/>
+                </a:tc>
+                <a:tc>
+                  <a:txBody>
+                    <a:bodyPr/>
+                    <a:lstStyle/>
+                    <a:p>
+                      <a:pPr algn="ctr"/>
+                      <a:r>
+                        <a:rPr lang="es-ES" b="0" dirty="0" smtClean="0">
+                          <a:latin typeface="Bodoni MT" panose="02070603080606020203" pitchFamily="18" charset="0"/>
+                        </a:rPr>
+                        <a:t>Si</a:t>
+                      </a:r>
+                      <a:endParaRPr lang="es-ES" b="0" dirty="0">
+                        <a:latin typeface="Bodoni MT" panose="02070603080606020203" pitchFamily="18" charset="0"/>
+                      </a:endParaRPr>
+                    </a:p>
+                  </a:txBody>
+                  <a:tcPr anchor="ctr"/>
+                </a:tc>
+                <a:extLst>
+                  <a:ext uri="{0D108BD9-81ED-4DB2-BD59-A6C34878D82A}">
+                    <a16:rowId xmlns:a16="http://schemas.microsoft.com/office/drawing/2014/main" val="2249822014"/>
+                  </a:ext>
+                </a:extLst>
+              </a:tr>
+              <a:tr h="584177">
+                <a:tc>
+                  <a:txBody>
+                    <a:bodyPr/>
+                    <a:lstStyle/>
+                    <a:p>
+                      <a:r>
+                        <a:rPr lang="es-ES" smtClean="0">
+                          <a:latin typeface="Bodoni MT" panose="02070603080606020203" pitchFamily="18" charset="0"/>
+                        </a:rPr>
+                        <a:t>Precio</a:t>
+                      </a:r>
+                      <a:endParaRPr lang="es-ES" dirty="0">
+                        <a:latin typeface="Bodoni MT" panose="02070603080606020203" pitchFamily="18" charset="0"/>
+                      </a:endParaRPr>
+                    </a:p>
+                  </a:txBody>
+                  <a:tcPr anchor="ctr"/>
+                </a:tc>
+                <a:tc>
+                  <a:txBody>
+                    <a:bodyPr/>
+                    <a:lstStyle/>
+                    <a:p>
+                      <a:pPr algn="ctr"/>
+                      <a:r>
+                        <a:rPr lang="es-ES" dirty="0" smtClean="0">
+                          <a:latin typeface="Bodoni MT" panose="02070603080606020203" pitchFamily="18" charset="0"/>
+                        </a:rPr>
+                        <a:t>110€</a:t>
+                      </a:r>
+                      <a:endParaRPr lang="es-ES" dirty="0">
+                        <a:latin typeface="Bodoni MT" panose="02070603080606020203" pitchFamily="18" charset="0"/>
+                      </a:endParaRPr>
+                    </a:p>
+                  </a:txBody>
+                  <a:tcPr anchor="ctr"/>
+                </a:tc>
+                <a:extLst>
+                  <a:ext uri="{0D108BD9-81ED-4DB2-BD59-A6C34878D82A}">
+                    <a16:rowId xmlns:a16="http://schemas.microsoft.com/office/drawing/2014/main" val="1854854630"/>
+                  </a:ext>
+                </a:extLst>
+              </a:tr>
+              <a:tr h="584177">
+                <a:tc>
+                  <a:txBody>
+                    <a:bodyPr/>
+                    <a:lstStyle/>
+                    <a:p>
+                      <a:r>
+                        <a:rPr lang="es-ES" smtClean="0">
+                          <a:latin typeface="Bodoni MT" panose="02070603080606020203" pitchFamily="18" charset="0"/>
+                        </a:rPr>
+                        <a:t>Aforo</a:t>
+                      </a:r>
+                      <a:endParaRPr lang="es-ES" dirty="0">
+                        <a:latin typeface="Bodoni MT" panose="02070603080606020203" pitchFamily="18" charset="0"/>
+                      </a:endParaRPr>
+                    </a:p>
+                  </a:txBody>
+                  <a:tcPr anchor="ctr"/>
+                </a:tc>
+                <a:tc>
+                  <a:txBody>
+                    <a:bodyPr/>
+                    <a:lstStyle/>
+                    <a:p>
+                      <a:pPr algn="ctr"/>
+                      <a:r>
+                        <a:rPr lang="es-ES" dirty="0" smtClean="0">
+                          <a:latin typeface="Bodoni MT" panose="02070603080606020203" pitchFamily="18" charset="0"/>
+                        </a:rPr>
+                        <a:t>115</a:t>
+                      </a:r>
+                      <a:endParaRPr lang="es-ES" dirty="0">
+                        <a:latin typeface="Bodoni MT" panose="02070603080606020203" pitchFamily="18" charset="0"/>
+                      </a:endParaRPr>
+                    </a:p>
+                  </a:txBody>
+                  <a:tcPr anchor="ctr"/>
+                </a:tc>
+                <a:extLst>
+                  <a:ext uri="{0D108BD9-81ED-4DB2-BD59-A6C34878D82A}">
+                    <a16:rowId xmlns:a16="http://schemas.microsoft.com/office/drawing/2014/main" val="1953533682"/>
+                  </a:ext>
+                </a:extLst>
+              </a:tr>
+            </a:tbl>
+          </a:graphicData>
+        </a:graphic>
+      </p:graphicFrame>
+      <p:pic>
+        <p:nvPicPr>
+          <p:cNvPr id="6" name="Marcador de contenido 5"/>
+          <p:cNvPicPr>
+            <a:picLocks noGrp="1" noChangeAspect="1"/>
+          </p:cNvPicPr>
+          <p:nvPr>
+            <p:ph idx="1"/>
+          </p:nvPr>
+        </p:nvPicPr>
+        <p:blipFill>
+          <a:blip r:embed="rId2">
+            <a:extLst>
+              <a:ext uri="{28A0092B-C50C-407E-A947-70E740481C1C}">
+                <a14:useLocalDpi xmlns:a14="http://schemas.microsoft.com/office/drawing/2010/main" val="0"/>
+              </a:ext>
+            </a:extLst>
+          </a:blip>
+          <a:stretch>
+            <a:fillRect/>
+          </a:stretch>
+        </p:blipFill>
+        <p:spPr>
+          <a:xfrm>
+            <a:off x="5646688" y="1915885"/>
+            <a:ext cx="6168025" cy="4101737"/>
+          </a:xfrm>
+        </p:spPr>
+      </p:pic>
+      <p:sp>
+        <p:nvSpPr>
+          <p:cNvPr id="7" name="Subtítulo 4"/>
+          <p:cNvSpPr txBox="1">
+            <a:spLocks/>
+          </p:cNvSpPr>
+          <p:nvPr/>
+        </p:nvSpPr>
+        <p:spPr>
+          <a:xfrm>
+            <a:off x="9528560" y="6275355"/>
+            <a:ext cx="2532812" cy="476796"/>
+          </a:xfrm>
+          <a:prstGeom prst="rect">
+            <a:avLst/>
+          </a:prstGeom>
+        </p:spPr>
+        <p:txBody>
+          <a:bodyPr vert="horz" lIns="91440" tIns="45720" rIns="91440" bIns="45720" rtlCol="0">
+            <a:noAutofit/>
+          </a:bodyPr>
+          <a:lstStyle>
+            <a:lvl1pPr marL="342900" indent="-342900" algn="l" defTabSz="457200" rtl="0" eaLnBrk="1" latinLnBrk="0" hangingPunct="1">
+              <a:spcBef>
+                <a:spcPts val="1000"/>
+              </a:spcBef>
+              <a:spcAft>
+                <a:spcPts val="0"/>
+              </a:spcAft>
+              <a:buClr>
+                <a:schemeClr val="accent1"/>
+              </a:buClr>
+              <a:buFont typeface="Wingdings 3" charset="2"/>
+              <a:buChar char=""/>
+              <a:defRPr sz="1800" kern="1200">
+                <a:solidFill>
+                  <a:schemeClr val="tx1">
+                    <a:lumMod val="75000"/>
+                    <a:lumOff val="25000"/>
+                  </a:schemeClr>
+                </a:solidFill>
+                <a:latin typeface="+mn-lt"/>
+                <a:ea typeface="+mn-ea"/>
+                <a:cs typeface="+mn-cs"/>
+              </a:defRPr>
+            </a:lvl1pPr>
+            <a:lvl2pPr marL="742950" indent="-285750" algn="l" defTabSz="457200" rtl="0" eaLnBrk="1" latinLnBrk="0" hangingPunct="1">
+              <a:spcBef>
+                <a:spcPts val="1000"/>
+              </a:spcBef>
+              <a:spcAft>
+                <a:spcPts val="0"/>
+              </a:spcAft>
+              <a:buClr>
+                <a:schemeClr val="accent1"/>
+              </a:buClr>
+              <a:buFont typeface="Wingdings 3" charset="2"/>
+              <a:buChar char=""/>
+              <a:defRPr sz="1600" kern="1200">
+                <a:solidFill>
+                  <a:schemeClr val="tx1">
+                    <a:lumMod val="75000"/>
+                    <a:lumOff val="25000"/>
+                  </a:schemeClr>
+                </a:solidFill>
+                <a:latin typeface="+mn-lt"/>
+                <a:ea typeface="+mn-ea"/>
+                <a:cs typeface="+mn-cs"/>
+              </a:defRPr>
+            </a:lvl2pPr>
+            <a:lvl3pPr marL="1143000" indent="-228600" algn="l" defTabSz="457200" rtl="0" eaLnBrk="1" latinLnBrk="0" hangingPunct="1">
+              <a:spcBef>
+                <a:spcPts val="1000"/>
+              </a:spcBef>
+              <a:spcAft>
+                <a:spcPts val="0"/>
+              </a:spcAft>
+              <a:buClr>
+                <a:schemeClr val="accent1"/>
+              </a:buClr>
+              <a:buFont typeface="Wingdings 3" charset="2"/>
+              <a:buChar char=""/>
+              <a:defRPr sz="1400" kern="1200">
+                <a:solidFill>
+                  <a:schemeClr val="tx1">
+                    <a:lumMod val="75000"/>
+                    <a:lumOff val="25000"/>
+                  </a:schemeClr>
+                </a:solidFill>
+                <a:latin typeface="+mn-lt"/>
+                <a:ea typeface="+mn-ea"/>
+                <a:cs typeface="+mn-cs"/>
+              </a:defRPr>
+            </a:lvl3pPr>
+            <a:lvl4pPr marL="1600200" indent="-228600" algn="l" defTabSz="457200" rtl="0" eaLnBrk="1" latinLnBrk="0" hangingPunct="1">
+              <a:spcBef>
+                <a:spcPts val="1000"/>
+              </a:spcBef>
+              <a:spcAft>
+                <a:spcPts val="0"/>
+              </a:spcAft>
+              <a:buClr>
+                <a:schemeClr val="accent1"/>
+              </a:buClr>
+              <a:buFont typeface="Wingdings 3" charset="2"/>
+              <a:buChar char=""/>
+              <a:defRPr sz="1200" kern="1200">
+                <a:solidFill>
+                  <a:schemeClr val="tx1">
+                    <a:lumMod val="75000"/>
+                    <a:lumOff val="25000"/>
+                  </a:schemeClr>
+                </a:solidFill>
+                <a:latin typeface="+mn-lt"/>
+                <a:ea typeface="+mn-ea"/>
+                <a:cs typeface="+mn-cs"/>
+              </a:defRPr>
+            </a:lvl4pPr>
+            <a:lvl5pPr marL="2057400" indent="-228600" algn="l" defTabSz="457200" rtl="0" eaLnBrk="1" latinLnBrk="0" hangingPunct="1">
+              <a:spcBef>
+                <a:spcPts val="1000"/>
+              </a:spcBef>
+              <a:spcAft>
+                <a:spcPts val="0"/>
+              </a:spcAft>
+              <a:buClr>
+                <a:schemeClr val="accent1"/>
+              </a:buClr>
+              <a:buFont typeface="Wingdings 3" charset="2"/>
+              <a:buChar char=""/>
+              <a:defRPr sz="1200" kern="1200">
+                <a:solidFill>
+                  <a:schemeClr val="tx1">
+                    <a:lumMod val="75000"/>
+                    <a:lumOff val="25000"/>
+                  </a:schemeClr>
+                </a:solidFill>
+                <a:latin typeface="+mn-lt"/>
+                <a:ea typeface="+mn-ea"/>
+                <a:cs typeface="+mn-cs"/>
+              </a:defRPr>
+            </a:lvl5pPr>
+            <a:lvl6pPr marL="2514600" indent="-228600" algn="l" defTabSz="457200" rtl="0" eaLnBrk="1" latinLnBrk="0" hangingPunct="1">
+              <a:spcBef>
+                <a:spcPts val="1000"/>
+              </a:spcBef>
+              <a:spcAft>
+                <a:spcPts val="0"/>
+              </a:spcAft>
+              <a:buClr>
+                <a:schemeClr val="accent1"/>
+              </a:buClr>
+              <a:buFont typeface="Wingdings 3" charset="2"/>
+              <a:buChar char=""/>
+              <a:defRPr sz="1200" kern="1200">
+                <a:solidFill>
+                  <a:schemeClr val="tx1">
+                    <a:lumMod val="75000"/>
+                    <a:lumOff val="25000"/>
+                  </a:schemeClr>
+                </a:solidFill>
+                <a:latin typeface="+mn-lt"/>
+                <a:ea typeface="+mn-ea"/>
+                <a:cs typeface="+mn-cs"/>
+              </a:defRPr>
+            </a:lvl6pPr>
+            <a:lvl7pPr marL="2971800" indent="-228600" algn="l" defTabSz="457200" rtl="0" eaLnBrk="1" latinLnBrk="0" hangingPunct="1">
+              <a:spcBef>
+                <a:spcPts val="1000"/>
+              </a:spcBef>
+              <a:spcAft>
+                <a:spcPts val="0"/>
+              </a:spcAft>
+              <a:buClr>
+                <a:schemeClr val="accent1"/>
+              </a:buClr>
+              <a:buFont typeface="Wingdings 3" charset="2"/>
+              <a:buChar char=""/>
+              <a:defRPr sz="1200" kern="1200">
+                <a:solidFill>
+                  <a:schemeClr val="tx1">
+                    <a:lumMod val="75000"/>
+                    <a:lumOff val="25000"/>
+                  </a:schemeClr>
+                </a:solidFill>
+                <a:latin typeface="+mn-lt"/>
+                <a:ea typeface="+mn-ea"/>
+                <a:cs typeface="+mn-cs"/>
+              </a:defRPr>
+            </a:lvl7pPr>
+            <a:lvl8pPr marL="3429000" indent="-228600" algn="l" defTabSz="457200" rtl="0" eaLnBrk="1" latinLnBrk="0" hangingPunct="1">
+              <a:spcBef>
+                <a:spcPts val="1000"/>
+              </a:spcBef>
+              <a:spcAft>
+                <a:spcPts val="0"/>
+              </a:spcAft>
+              <a:buClr>
+                <a:schemeClr val="accent1"/>
+              </a:buClr>
+              <a:buFont typeface="Wingdings 3" charset="2"/>
+              <a:buChar char=""/>
+              <a:defRPr sz="1200" kern="1200">
+                <a:solidFill>
+                  <a:schemeClr val="tx1">
+                    <a:lumMod val="75000"/>
+                    <a:lumOff val="25000"/>
+                  </a:schemeClr>
+                </a:solidFill>
+                <a:latin typeface="+mn-lt"/>
+                <a:ea typeface="+mn-ea"/>
+                <a:cs typeface="+mn-cs"/>
+              </a:defRPr>
+            </a:lvl8pPr>
+            <a:lvl9pPr marL="3886200" indent="-228600" algn="l" defTabSz="457200" rtl="0" eaLnBrk="1" latinLnBrk="0" hangingPunct="1">
+              <a:spcBef>
+                <a:spcPts val="1000"/>
+              </a:spcBef>
+              <a:spcAft>
+                <a:spcPts val="0"/>
+              </a:spcAft>
+              <a:buClr>
+                <a:schemeClr val="accent1"/>
+              </a:buClr>
+              <a:buFont typeface="Wingdings 3" charset="2"/>
+              <a:buChar char=""/>
+              <a:defRPr sz="1200" kern="1200">
+                <a:solidFill>
+                  <a:schemeClr val="tx1">
+                    <a:lumMod val="75000"/>
+                    <a:lumOff val="25000"/>
+                  </a:schemeClr>
+                </a:solidFill>
+                <a:latin typeface="+mn-lt"/>
+                <a:ea typeface="+mn-ea"/>
+                <a:cs typeface="+mn-cs"/>
+              </a:defRPr>
+            </a:lvl9pPr>
+          </a:lstStyle>
+          <a:p>
+            <a:r>
+              <a:rPr lang="es-ES" sz="2000" b="1" i="1" dirty="0" smtClean="0">
+                <a:effectLst>
+                  <a:reflection blurRad="6350" stA="55000" endA="300" endPos="45500" dir="5400000" sy="-100000" algn="bl" rotWithShape="0"/>
+                </a:effectLst>
+                <a:latin typeface="Algerian" panose="04020705040A02060702" pitchFamily="82" charset="0"/>
+                <a:cs typeface="Arial" panose="020B0604020202020204" pitchFamily="34" charset="0"/>
+              </a:rPr>
+              <a:t>Fede &amp; Óscar</a:t>
+            </a:r>
+          </a:p>
+        </p:txBody>
+      </p:sp>
+    </p:spTree>
+    <p:extLst>
+      <p:ext uri="{BB962C8B-B14F-4D97-AF65-F5344CB8AC3E}">
+        <p14:creationId xmlns:p14="http://schemas.microsoft.com/office/powerpoint/2010/main" val="1758079688"/>
+      </p:ext>
+    </p:extLst>
+  </p:cSld>
+  <p:clrMapOvr>
+    <a:masterClrMapping/>
+  </p:clrMapOvr>
+  <p:transition spd="slow">
+    <p:randomBar dir="vert"/>
+  </p:transition>
+  <p:timing>
+    <p:tnLst>
+      <p:par>
+        <p:cTn id="1" dur="indefinite" restart="never" nodeType="tmRoot">
+          <p:childTnLst>
+            <p:seq concurrent="1" nextAc="seek">
+              <p:cTn id="2" dur="indefinite" nodeType="mainSeq">
+                <p:childTnLst>
+                  <p:par>
+                    <p:cTn id="3" fill="hold">
+                      <p:stCondLst>
+                        <p:cond delay="indefinite"/>
+                      </p:stCondLst>
+                      <p:childTnLst>
+                        <p:par>
+                          <p:cTn id="4" fill="hold">
+                            <p:stCondLst>
+                              <p:cond delay="0"/>
+                            </p:stCondLst>
+                            <p:childTnLst>
+                              <p:par>
+                                <p:cTn id="5" presetID="1" presetClass="entr" presetSubtype="0" fill="hold" grpId="0" nodeType="clickEffect">
+                                  <p:stCondLst>
+                                    <p:cond delay="0"/>
+                                  </p:stCondLst>
+                                  <p:childTnLst>
+                                    <p:set>
+                                      <p:cBhvr>
+                                        <p:cTn id="6" dur="1" fill="hold">
+                                          <p:stCondLst>
+                                            <p:cond delay="0"/>
+                                          </p:stCondLst>
+                                        </p:cTn>
+                                        <p:tgtEl>
+                                          <p:spTgt spid="7"/>
+                                        </p:tgtEl>
+                                        <p:attrNameLst>
+                                          <p:attrName>style.visibility</p:attrName>
+                                        </p:attrNameLst>
+                                      </p:cBhvr>
+                                      <p:to>
+                                        <p:strVal val="visible"/>
+                                      </p:to>
+                                    </p:set>
+                                  </p:childTnLst>
+                                </p:cTn>
+                              </p:par>
+                            </p:childTnLst>
+                          </p:cTn>
+                        </p:par>
+                      </p:childTnLst>
+                    </p:cTn>
+                  </p:par>
+                </p:childTnLst>
+              </p:cTn>
+              <p:prevCondLst>
+                <p:cond evt="onPrev" delay="0">
+                  <p:tgtEl>
+                    <p:sldTgt/>
+                  </p:tgtEl>
+                </p:cond>
+              </p:prevCondLst>
+              <p:nextCondLst>
+                <p:cond evt="onNext" delay="0">
+                  <p:tgtEl>
+                    <p:sldTgt/>
+                  </p:tgtEl>
+                </p:cond>
+              </p:nextCondLst>
+            </p:seq>
+          </p:childTnLst>
+        </p:cTn>
+      </p:par>
+    </p:tnLst>
+    <p:bldLst>
+      <p:bldP spid="7" grpId="0"/>
+    </p:bldLst>
+  </p:timing>
+</p:sld>
+</file>
+
+<file path=ppt/slides/slide8.xml><?xml version="1.0" encoding="utf-8"?>
+<p:sld xmlns:a="http://schemas.openxmlformats.org/drawingml/2006/main" xmlns:r="http://schemas.openxmlformats.org/officeDocument/2006/relationships" xmlns:p="http://schemas.openxmlformats.org/presentationml/2006/main">
+  <p:cSld>
+    <p:spTree>
+      <p:nvGrpSpPr>
+        <p:cNvPr id="1" name=""/>
+        <p:cNvGrpSpPr/>
+        <p:nvPr/>
+      </p:nvGrpSpPr>
+      <p:grpSpPr>
+        <a:xfrm>
+          <a:off x="0" y="0"/>
+          <a:ext cx="0" cy="0"/>
+          <a:chOff x="0" y="0"/>
+          <a:chExt cx="0" cy="0"/>
+        </a:xfrm>
+      </p:grpSpPr>
+      <p:sp>
+        <p:nvSpPr>
+          <p:cNvPr id="5" name="Subtítulo 4"/>
+          <p:cNvSpPr>
+            <a:spLocks noGrp="1"/>
+          </p:cNvSpPr>
+          <p:nvPr>
+            <p:ph type="subTitle" idx="1"/>
+          </p:nvPr>
+        </p:nvSpPr>
+        <p:spPr>
+          <a:xfrm>
+            <a:off x="1892528" y="1529082"/>
+            <a:ext cx="8915399" cy="4323078"/>
+          </a:xfrm>
+        </p:spPr>
+        <p:txBody>
+          <a:bodyPr/>
+          <a:lstStyle/>
+          <a:p>
+            <a:r>
+              <a:rPr lang="es-ES" dirty="0" smtClean="0">
+                <a:latin typeface="Arial" panose="020B0604020202020204" pitchFamily="34" charset="0"/>
+                <a:cs typeface="Arial" panose="020B0604020202020204" pitchFamily="34" charset="0"/>
+              </a:rPr>
+              <a:t>Estos serian los ayuntamientos mas cercanos a su vivienda.</a:t>
+            </a:r>
+          </a:p>
+          <a:p>
+            <a:endParaRPr lang="es-ES" dirty="0" smtClean="0">
+              <a:latin typeface="Arial" panose="020B0604020202020204" pitchFamily="34" charset="0"/>
               <a:cs typeface="Arial" panose="020B0604020202020204" pitchFamily="34" charset="0"/>
             </a:endParaRPr>
+          </a:p>
+          <a:p>
+            <a:r>
+              <a:rPr lang="es-ES" dirty="0" smtClean="0">
+                <a:latin typeface="Arial" panose="020B0604020202020204" pitchFamily="34" charset="0"/>
+                <a:cs typeface="Arial" panose="020B0604020202020204" pitchFamily="34" charset="0"/>
+              </a:rPr>
+              <a:t>Nos gustaría saber con esta información que les hemos proporcionado, si les gusta alguno de estos ayuntamientos para vuestro enlace matrimonial.</a:t>
+            </a:r>
+          </a:p>
+          <a:p>
+            <a:endParaRPr lang="es-ES" dirty="0">
+              <a:latin typeface="Arial" panose="020B0604020202020204" pitchFamily="34" charset="0"/>
+              <a:cs typeface="Arial" panose="020B0604020202020204" pitchFamily="34" charset="0"/>
+            </a:endParaRPr>
+          </a:p>
+          <a:p>
+            <a:r>
+              <a:rPr lang="es-ES" dirty="0" smtClean="0">
+                <a:latin typeface="Arial" panose="020B0604020202020204" pitchFamily="34" charset="0"/>
+                <a:cs typeface="Arial" panose="020B0604020202020204" pitchFamily="34" charset="0"/>
+              </a:rPr>
+              <a:t>Si alguno de ellos es de su agrado díganoslo y reservaremos al instante, en caso contrario díganos si tiene algún ayuntamiento en particular donde desee hacer la celebración o si </a:t>
+            </a:r>
+            <a:r>
+              <a:rPr lang="es-ES" dirty="0" smtClean="0">
+                <a:latin typeface="Arial" panose="020B0604020202020204" pitchFamily="34" charset="0"/>
+                <a:cs typeface="Arial" panose="020B0604020202020204" pitchFamily="34" charset="0"/>
+              </a:rPr>
+              <a:t>prefiere le volveremos a </a:t>
+            </a:r>
+            <a:r>
+              <a:rPr lang="es-ES" dirty="0" smtClean="0">
+                <a:latin typeface="Arial" panose="020B0604020202020204" pitchFamily="34" charset="0"/>
+                <a:cs typeface="Arial" panose="020B0604020202020204" pitchFamily="34" charset="0"/>
+              </a:rPr>
+              <a:t>enviar presupuestos de otros ayuntamientos.</a:t>
+            </a:r>
+          </a:p>
+          <a:p>
+            <a:endParaRPr lang="es-ES" dirty="0">
+              <a:latin typeface="Arial" panose="020B0604020202020204" pitchFamily="34" charset="0"/>
+              <a:cs typeface="Arial" panose="020B0604020202020204" pitchFamily="34" charset="0"/>
+            </a:endParaRPr>
+          </a:p>
+          <a:p>
+            <a:r>
+              <a:rPr lang="es-ES" dirty="0" smtClean="0">
+                <a:latin typeface="Arial" panose="020B0604020202020204" pitchFamily="34" charset="0"/>
+                <a:cs typeface="Arial" panose="020B0604020202020204" pitchFamily="34" charset="0"/>
+              </a:rPr>
+              <a:t>Responder a este correo: </a:t>
+            </a:r>
+            <a:r>
+              <a:rPr lang="es-ES" b="1" dirty="0" smtClean="0">
+                <a:latin typeface="Arial" panose="020B0604020202020204" pitchFamily="34" charset="0"/>
+                <a:cs typeface="Arial" panose="020B0604020202020204" pitchFamily="34" charset="0"/>
+              </a:rPr>
+              <a:t>ivandelatorre98@Gmail.com</a:t>
+            </a:r>
+          </a:p>
+        </p:txBody>
+      </p:sp>
+      <p:sp>
+        <p:nvSpPr>
+          <p:cNvPr id="4" name="Subtítulo 4"/>
+          <p:cNvSpPr txBox="1">
+            <a:spLocks/>
+          </p:cNvSpPr>
+          <p:nvPr/>
+        </p:nvSpPr>
+        <p:spPr>
+          <a:xfrm>
+            <a:off x="9528560" y="6275355"/>
+            <a:ext cx="2532812" cy="476796"/>
+          </a:xfrm>
+          <a:prstGeom prst="rect">
+            <a:avLst/>
+          </a:prstGeom>
+        </p:spPr>
+        <p:txBody>
+          <a:bodyPr vert="horz" lIns="91440" tIns="45720" rIns="91440" bIns="45720" rtlCol="0">
+            <a:noAutofit/>
+          </a:bodyPr>
+          <a:lstStyle>
+            <a:lvl1pPr marL="342900" indent="-342900" algn="l" defTabSz="457200" rtl="0" eaLnBrk="1" latinLnBrk="0" hangingPunct="1">
+              <a:spcBef>
+                <a:spcPts val="1000"/>
+              </a:spcBef>
+              <a:spcAft>
+                <a:spcPts val="0"/>
+              </a:spcAft>
+              <a:buClr>
+                <a:schemeClr val="accent1"/>
+              </a:buClr>
+              <a:buFont typeface="Wingdings 3" charset="2"/>
+              <a:buChar char=""/>
+              <a:defRPr sz="1800" kern="1200">
+                <a:solidFill>
+                  <a:schemeClr val="tx1">
+                    <a:lumMod val="75000"/>
+                    <a:lumOff val="25000"/>
+                  </a:schemeClr>
+                </a:solidFill>
+                <a:latin typeface="+mn-lt"/>
+                <a:ea typeface="+mn-ea"/>
+                <a:cs typeface="+mn-cs"/>
+              </a:defRPr>
+            </a:lvl1pPr>
+            <a:lvl2pPr marL="742950" indent="-285750" algn="l" defTabSz="457200" rtl="0" eaLnBrk="1" latinLnBrk="0" hangingPunct="1">
+              <a:spcBef>
+                <a:spcPts val="1000"/>
+              </a:spcBef>
+              <a:spcAft>
+                <a:spcPts val="0"/>
+              </a:spcAft>
+              <a:buClr>
+                <a:schemeClr val="accent1"/>
+              </a:buClr>
+              <a:buFont typeface="Wingdings 3" charset="2"/>
+              <a:buChar char=""/>
+              <a:defRPr sz="1600" kern="1200">
+                <a:solidFill>
+                  <a:schemeClr val="tx1">
+                    <a:lumMod val="75000"/>
+                    <a:lumOff val="25000"/>
+                  </a:schemeClr>
+                </a:solidFill>
+                <a:latin typeface="+mn-lt"/>
+                <a:ea typeface="+mn-ea"/>
+                <a:cs typeface="+mn-cs"/>
+              </a:defRPr>
+            </a:lvl2pPr>
+            <a:lvl3pPr marL="1143000" indent="-228600" algn="l" defTabSz="457200" rtl="0" eaLnBrk="1" latinLnBrk="0" hangingPunct="1">
+              <a:spcBef>
+                <a:spcPts val="1000"/>
+              </a:spcBef>
+              <a:spcAft>
+                <a:spcPts val="0"/>
+              </a:spcAft>
+              <a:buClr>
+                <a:schemeClr val="accent1"/>
+              </a:buClr>
+              <a:buFont typeface="Wingdings 3" charset="2"/>
+              <a:buChar char=""/>
+              <a:defRPr sz="1400" kern="1200">
+                <a:solidFill>
+                  <a:schemeClr val="tx1">
+                    <a:lumMod val="75000"/>
+                    <a:lumOff val="25000"/>
+                  </a:schemeClr>
+                </a:solidFill>
+                <a:latin typeface="+mn-lt"/>
+                <a:ea typeface="+mn-ea"/>
+                <a:cs typeface="+mn-cs"/>
+              </a:defRPr>
+            </a:lvl3pPr>
+            <a:lvl4pPr marL="1600200" indent="-228600" algn="l" defTabSz="457200" rtl="0" eaLnBrk="1" latinLnBrk="0" hangingPunct="1">
+              <a:spcBef>
+                <a:spcPts val="1000"/>
+              </a:spcBef>
+              <a:spcAft>
+                <a:spcPts val="0"/>
+              </a:spcAft>
+              <a:buClr>
+                <a:schemeClr val="accent1"/>
+              </a:buClr>
+              <a:buFont typeface="Wingdings 3" charset="2"/>
+              <a:buChar char=""/>
+              <a:defRPr sz="1200" kern="1200">
+                <a:solidFill>
+                  <a:schemeClr val="tx1">
+                    <a:lumMod val="75000"/>
+                    <a:lumOff val="25000"/>
+                  </a:schemeClr>
+                </a:solidFill>
+                <a:latin typeface="+mn-lt"/>
+                <a:ea typeface="+mn-ea"/>
+                <a:cs typeface="+mn-cs"/>
+              </a:defRPr>
+            </a:lvl4pPr>
+            <a:lvl5pPr marL="2057400" indent="-228600" algn="l" defTabSz="457200" rtl="0" eaLnBrk="1" latinLnBrk="0" hangingPunct="1">
+              <a:spcBef>
+                <a:spcPts val="1000"/>
+              </a:spcBef>
+              <a:spcAft>
+                <a:spcPts val="0"/>
+              </a:spcAft>
+              <a:buClr>
+                <a:schemeClr val="accent1"/>
+              </a:buClr>
+              <a:buFont typeface="Wingdings 3" charset="2"/>
+              <a:buChar char=""/>
+              <a:defRPr sz="1200" kern="1200">
+                <a:solidFill>
+                  <a:schemeClr val="tx1">
+                    <a:lumMod val="75000"/>
+                    <a:lumOff val="25000"/>
+                  </a:schemeClr>
+                </a:solidFill>
+                <a:latin typeface="+mn-lt"/>
+                <a:ea typeface="+mn-ea"/>
+                <a:cs typeface="+mn-cs"/>
+              </a:defRPr>
+            </a:lvl5pPr>
+            <a:lvl6pPr marL="2514600" indent="-228600" algn="l" defTabSz="457200" rtl="0" eaLnBrk="1" latinLnBrk="0" hangingPunct="1">
+              <a:spcBef>
+                <a:spcPts val="1000"/>
+              </a:spcBef>
+              <a:spcAft>
+                <a:spcPts val="0"/>
+              </a:spcAft>
+              <a:buClr>
+                <a:schemeClr val="accent1"/>
+              </a:buClr>
+              <a:buFont typeface="Wingdings 3" charset="2"/>
+              <a:buChar char=""/>
+              <a:defRPr sz="1200" kern="1200">
+                <a:solidFill>
+                  <a:schemeClr val="tx1">
+                    <a:lumMod val="75000"/>
+                    <a:lumOff val="25000"/>
+                  </a:schemeClr>
+                </a:solidFill>
+                <a:latin typeface="+mn-lt"/>
+                <a:ea typeface="+mn-ea"/>
+                <a:cs typeface="+mn-cs"/>
+              </a:defRPr>
+            </a:lvl6pPr>
+            <a:lvl7pPr marL="2971800" indent="-228600" algn="l" defTabSz="457200" rtl="0" eaLnBrk="1" latinLnBrk="0" hangingPunct="1">
+              <a:spcBef>
+                <a:spcPts val="1000"/>
+              </a:spcBef>
+              <a:spcAft>
+                <a:spcPts val="0"/>
+              </a:spcAft>
+              <a:buClr>
+                <a:schemeClr val="accent1"/>
+              </a:buClr>
+              <a:buFont typeface="Wingdings 3" charset="2"/>
+              <a:buChar char=""/>
+              <a:defRPr sz="1200" kern="1200">
+                <a:solidFill>
+                  <a:schemeClr val="tx1">
+                    <a:lumMod val="75000"/>
+                    <a:lumOff val="25000"/>
+                  </a:schemeClr>
+                </a:solidFill>
+                <a:latin typeface="+mn-lt"/>
+                <a:ea typeface="+mn-ea"/>
+                <a:cs typeface="+mn-cs"/>
+              </a:defRPr>
+            </a:lvl7pPr>
+            <a:lvl8pPr marL="3429000" indent="-228600" algn="l" defTabSz="457200" rtl="0" eaLnBrk="1" latinLnBrk="0" hangingPunct="1">
+              <a:spcBef>
+                <a:spcPts val="1000"/>
+              </a:spcBef>
+              <a:spcAft>
+                <a:spcPts val="0"/>
+              </a:spcAft>
+              <a:buClr>
+                <a:schemeClr val="accent1"/>
+              </a:buClr>
+              <a:buFont typeface="Wingdings 3" charset="2"/>
+              <a:buChar char=""/>
+              <a:defRPr sz="1200" kern="1200">
+                <a:solidFill>
+                  <a:schemeClr val="tx1">
+                    <a:lumMod val="75000"/>
+                    <a:lumOff val="25000"/>
+                  </a:schemeClr>
+                </a:solidFill>
+                <a:latin typeface="+mn-lt"/>
+                <a:ea typeface="+mn-ea"/>
+                <a:cs typeface="+mn-cs"/>
+              </a:defRPr>
+            </a:lvl8pPr>
+            <a:lvl9pPr marL="3886200" indent="-228600" algn="l" defTabSz="457200" rtl="0" eaLnBrk="1" latinLnBrk="0" hangingPunct="1">
+              <a:spcBef>
+                <a:spcPts val="1000"/>
+              </a:spcBef>
+              <a:spcAft>
+                <a:spcPts val="0"/>
+              </a:spcAft>
+              <a:buClr>
+                <a:schemeClr val="accent1"/>
+              </a:buClr>
+              <a:buFont typeface="Wingdings 3" charset="2"/>
+              <a:buChar char=""/>
+              <a:defRPr sz="1200" kern="1200">
+                <a:solidFill>
+                  <a:schemeClr val="tx1">
+                    <a:lumMod val="75000"/>
+                    <a:lumOff val="25000"/>
+                  </a:schemeClr>
+                </a:solidFill>
+                <a:latin typeface="+mn-lt"/>
+                <a:ea typeface="+mn-ea"/>
+                <a:cs typeface="+mn-cs"/>
+              </a:defRPr>
+            </a:lvl9pPr>
+          </a:lstStyle>
+          <a:p>
+            <a:r>
+              <a:rPr lang="es-ES" sz="2000" b="1" i="1" dirty="0" smtClean="0">
+                <a:effectLst>
+                  <a:reflection blurRad="6350" stA="55000" endA="300" endPos="45500" dir="5400000" sy="-100000" algn="bl" rotWithShape="0"/>
+                </a:effectLst>
+                <a:latin typeface="Algerian" panose="04020705040A02060702" pitchFamily="82" charset="0"/>
+                <a:cs typeface="Arial" panose="020B0604020202020204" pitchFamily="34" charset="0"/>
+              </a:rPr>
+              <a:t>Fede &amp; Óscar</a:t>
+            </a:r>
           </a:p>
         </p:txBody>
       </p:sp>

</xml_diff>

<commit_message>
Finalizacionm PowerPoint musica y regalos
</commit_message>
<xml_diff>
--- a/Ayuntamiento/Elegir ayuntamiento.pptx
+++ b/Ayuntamiento/Elegir ayuntamiento.pptx
@@ -308,7 +308,7 @@
             <a:fld id="{B61BEF0D-F0BB-DE4B-95CE-6DB70DBA9567}" type="datetimeFigureOut">
               <a:rPr lang="en-US" dirty="0"/>
               <a:pPr/>
-              <a:t>6/8/2019</a:t>
+              <a:t>6/12/2019</a:t>
             </a:fld>
             <a:endParaRPr lang="en-US" dirty="0"/>
           </a:p>
@@ -643,7 +643,7 @@
             <a:fld id="{B61BEF0D-F0BB-DE4B-95CE-6DB70DBA9567}" type="datetimeFigureOut">
               <a:rPr lang="en-US" dirty="0"/>
               <a:pPr/>
-              <a:t>6/8/2019</a:t>
+              <a:t>6/12/2019</a:t>
             </a:fld>
             <a:endParaRPr lang="en-US" dirty="0"/>
           </a:p>
@@ -1041,7 +1041,7 @@
             <a:fld id="{B61BEF0D-F0BB-DE4B-95CE-6DB70DBA9567}" type="datetimeFigureOut">
               <a:rPr lang="en-US" dirty="0"/>
               <a:pPr/>
-              <a:t>6/8/2019</a:t>
+              <a:t>6/12/2019</a:t>
             </a:fld>
             <a:endParaRPr lang="en-US" dirty="0"/>
           </a:p>
@@ -1373,7 +1373,7 @@
             <a:fld id="{B61BEF0D-F0BB-DE4B-95CE-6DB70DBA9567}" type="datetimeFigureOut">
               <a:rPr lang="en-US" dirty="0"/>
               <a:pPr/>
-              <a:t>6/8/2019</a:t>
+              <a:t>6/12/2019</a:t>
             </a:fld>
             <a:endParaRPr lang="en-US" dirty="0"/>
           </a:p>
@@ -1690,7 +1690,7 @@
             <a:fld id="{B61BEF0D-F0BB-DE4B-95CE-6DB70DBA9567}" type="datetimeFigureOut">
               <a:rPr lang="en-US" dirty="0"/>
               <a:pPr/>
-              <a:t>6/8/2019</a:t>
+              <a:t>6/12/2019</a:t>
             </a:fld>
             <a:endParaRPr lang="en-US" dirty="0"/>
           </a:p>
@@ -2083,7 +2083,7 @@
             <a:fld id="{B61BEF0D-F0BB-DE4B-95CE-6DB70DBA9567}" type="datetimeFigureOut">
               <a:rPr lang="en-US" dirty="0"/>
               <a:pPr/>
-              <a:t>6/8/2019</a:t>
+              <a:t>6/12/2019</a:t>
             </a:fld>
             <a:endParaRPr lang="en-US" dirty="0"/>
           </a:p>
@@ -2337,7 +2337,7 @@
             <a:fld id="{B61BEF0D-F0BB-DE4B-95CE-6DB70DBA9567}" type="datetimeFigureOut">
               <a:rPr lang="en-US" dirty="0"/>
               <a:pPr/>
-              <a:t>6/8/2019</a:t>
+              <a:t>6/12/2019</a:t>
             </a:fld>
             <a:endParaRPr lang="en-US" dirty="0"/>
           </a:p>
@@ -2596,7 +2596,7 @@
             <a:fld id="{B61BEF0D-F0BB-DE4B-95CE-6DB70DBA9567}" type="datetimeFigureOut">
               <a:rPr lang="en-US" dirty="0"/>
               <a:pPr/>
-              <a:t>6/8/2019</a:t>
+              <a:t>6/12/2019</a:t>
             </a:fld>
             <a:endParaRPr lang="en-US" dirty="0"/>
           </a:p>
@@ -2855,7 +2855,7 @@
             <a:fld id="{B61BEF0D-F0BB-DE4B-95CE-6DB70DBA9567}" type="datetimeFigureOut">
               <a:rPr lang="en-US" dirty="0"/>
               <a:pPr/>
-              <a:t>6/8/2019</a:t>
+              <a:t>6/12/2019</a:t>
             </a:fld>
             <a:endParaRPr lang="en-US" dirty="0"/>
           </a:p>
@@ -3181,7 +3181,7 @@
             <a:fld id="{B61BEF0D-F0BB-DE4B-95CE-6DB70DBA9567}" type="datetimeFigureOut">
               <a:rPr lang="en-US" dirty="0"/>
               <a:pPr/>
-              <a:t>6/8/2019</a:t>
+              <a:t>6/12/2019</a:t>
             </a:fld>
             <a:endParaRPr lang="en-US" dirty="0"/>
           </a:p>
@@ -3501,7 +3501,7 @@
             <a:fld id="{B61BEF0D-F0BB-DE4B-95CE-6DB70DBA9567}" type="datetimeFigureOut">
               <a:rPr lang="en-US" dirty="0"/>
               <a:pPr/>
-              <a:t>6/8/2019</a:t>
+              <a:t>6/12/2019</a:t>
             </a:fld>
             <a:endParaRPr lang="en-US" dirty="0"/>
           </a:p>
@@ -3955,7 +3955,7 @@
             <a:fld id="{B61BEF0D-F0BB-DE4B-95CE-6DB70DBA9567}" type="datetimeFigureOut">
               <a:rPr lang="en-US" dirty="0"/>
               <a:pPr/>
-              <a:t>6/8/2019</a:t>
+              <a:t>6/12/2019</a:t>
             </a:fld>
             <a:endParaRPr lang="en-US" dirty="0"/>
           </a:p>
@@ -4157,7 +4157,7 @@
             <a:fld id="{B61BEF0D-F0BB-DE4B-95CE-6DB70DBA9567}" type="datetimeFigureOut">
               <a:rPr lang="en-US" dirty="0"/>
               <a:pPr/>
-              <a:t>6/8/2019</a:t>
+              <a:t>6/12/2019</a:t>
             </a:fld>
             <a:endParaRPr lang="en-US" dirty="0"/>
           </a:p>
@@ -4331,7 +4331,7 @@
             <a:fld id="{B61BEF0D-F0BB-DE4B-95CE-6DB70DBA9567}" type="datetimeFigureOut">
               <a:rPr lang="en-US" dirty="0"/>
               <a:pPr/>
-              <a:t>6/8/2019</a:t>
+              <a:t>6/12/2019</a:t>
             </a:fld>
             <a:endParaRPr lang="en-US" dirty="0"/>
           </a:p>
@@ -4661,7 +4661,7 @@
             <a:fld id="{B61BEF0D-F0BB-DE4B-95CE-6DB70DBA9567}" type="datetimeFigureOut">
               <a:rPr lang="en-US" dirty="0"/>
               <a:pPr/>
-              <a:t>6/8/2019</a:t>
+              <a:t>6/12/2019</a:t>
             </a:fld>
             <a:endParaRPr lang="en-US" dirty="0"/>
           </a:p>
@@ -5003,7 +5003,7 @@
             <a:fld id="{B61BEF0D-F0BB-DE4B-95CE-6DB70DBA9567}" type="datetimeFigureOut">
               <a:rPr lang="en-US" dirty="0"/>
               <a:pPr/>
-              <a:t>6/8/2019</a:t>
+              <a:t>6/12/2019</a:t>
             </a:fld>
             <a:endParaRPr lang="en-US" dirty="0"/>
           </a:p>
@@ -7117,7 +7117,7 @@
             <a:fld id="{B61BEF0D-F0BB-DE4B-95CE-6DB70DBA9567}" type="datetimeFigureOut">
               <a:rPr lang="en-US" dirty="0"/>
               <a:pPr/>
-              <a:t>6/8/2019</a:t>
+              <a:t>6/12/2019</a:t>
             </a:fld>
             <a:endParaRPr lang="en-US" dirty="0"/>
           </a:p>
@@ -9001,22 +9001,21 @@
           <a:p>
             <a:pPr algn="ctr"/>
             <a:r>
-              <a:rPr lang="es-ES" dirty="0"/>
+              <a:rPr lang="es-ES" b="1" dirty="0">
+                <a:ln w="0"/>
+                <a:solidFill>
+                  <a:schemeClr val="accent1"/>
+                </a:solidFill>
+                <a:effectLst>
+                  <a:outerShdw blurRad="38100" dist="25400" dir="5400000" algn="ctr" rotWithShape="0">
+                    <a:srgbClr val="6E747A">
+                      <a:alpha val="43000"/>
+                    </a:srgbClr>
+                  </a:outerShdw>
+                </a:effectLst>
+              </a:rPr>
               <a:t>San Lorenzo del Escorial</a:t>
             </a:r>
-            <a:endParaRPr lang="es-ES" b="1" dirty="0">
-              <a:ln w="0"/>
-              <a:solidFill>
-                <a:schemeClr val="accent1"/>
-              </a:solidFill>
-              <a:effectLst>
-                <a:outerShdw blurRad="38100" dist="25400" dir="5400000" algn="ctr" rotWithShape="0">
-                  <a:srgbClr val="6E747A">
-                    <a:alpha val="43000"/>
-                  </a:srgbClr>
-                </a:outerShdw>
-              </a:effectLst>
-            </a:endParaRPr>
           </a:p>
         </p:txBody>
       </p:sp>
@@ -11510,21 +11509,7 @@
                 <a:latin typeface="Arial" panose="020B0604020202020204" pitchFamily="34" charset="0"/>
                 <a:cs typeface="Arial" panose="020B0604020202020204" pitchFamily="34" charset="0"/>
               </a:rPr>
-              <a:t>Si alguno de ellos es de su agrado díganoslo y reservaremos al instante, en caso contrario díganos si tiene algún ayuntamiento en particular donde desee hacer la celebración o si </a:t>
-            </a:r>
-            <a:r>
-              <a:rPr lang="es-ES" dirty="0" smtClean="0">
-                <a:latin typeface="Arial" panose="020B0604020202020204" pitchFamily="34" charset="0"/>
-                <a:cs typeface="Arial" panose="020B0604020202020204" pitchFamily="34" charset="0"/>
-              </a:rPr>
-              <a:t>prefiere le volveremos a </a:t>
-            </a:r>
-            <a:r>
-              <a:rPr lang="es-ES" dirty="0" smtClean="0">
-                <a:latin typeface="Arial" panose="020B0604020202020204" pitchFamily="34" charset="0"/>
-                <a:cs typeface="Arial" panose="020B0604020202020204" pitchFamily="34" charset="0"/>
-              </a:rPr>
-              <a:t>enviar presupuestos de otros ayuntamientos.</a:t>
+              <a:t>Si alguno de ellos es de su agrado díganoslo y reservaremos al instante, en caso contrario díganos si tiene algún ayuntamiento en particular donde desee hacer la celebración o si prefiere le volveremos a enviar presupuestos de otros ayuntamientos.</a:t>
             </a:r>
           </a:p>
           <a:p>

</xml_diff>